<commit_message>
Update Android Çalışma Yapısı.pptx
</commit_message>
<xml_diff>
--- a/Android Çalışma Yapısı.pptx
+++ b/Android Çalışma Yapısı.pptx
@@ -1037,33 +1037,15 @@
         <a:lstStyle/>
         <a:p>
           <a:r>
-            <a:rPr lang="en-US" dirty="0" err="1"/>
-            <a:t>Arka</a:t>
+            <a:rPr lang="en-US" dirty="0"/>
+            <a:t>Arka Plandan Tekrar</a:t>
           </a:r>
-          <a:r>
-            <a:rPr lang="en-US" dirty="0"/>
-            <a:t> </a:t>
-          </a:r>
-          <a:r>
-            <a:rPr lang="en-US" dirty="0" err="1"/>
-            <a:t>Plandan</a:t>
-          </a:r>
-          <a:r>
-            <a:rPr lang="en-US" dirty="0"/>
-            <a:t> </a:t>
-          </a:r>
-          <a:r>
-            <a:rPr lang="en-US" dirty="0" err="1"/>
-            <a:t>Tekrar</a:t>
-          </a:r>
-          <a:endParaRPr lang="en-US" dirty="0"/>
         </a:p>
         <a:p>
           <a:r>
-            <a:rPr lang="en-US" dirty="0" err="1"/>
+            <a:rPr lang="en-US" dirty="0"/>
             <a:t>Çağrıldığında</a:t>
           </a:r>
-          <a:endParaRPr lang="en-US" dirty="0"/>
         </a:p>
       </dgm:t>
     </dgm:pt>
@@ -1104,33 +1086,15 @@
         <a:lstStyle/>
         <a:p>
           <a:r>
-            <a:rPr lang="en-US" dirty="0" err="1"/>
-            <a:t>Arka</a:t>
+            <a:rPr lang="en-US" dirty="0"/>
+            <a:t>Arka Plandan Tekrar</a:t>
           </a:r>
-          <a:r>
-            <a:rPr lang="en-US" dirty="0"/>
-            <a:t> </a:t>
-          </a:r>
-          <a:r>
-            <a:rPr lang="en-US" dirty="0" err="1"/>
-            <a:t>Plandan</a:t>
-          </a:r>
-          <a:r>
-            <a:rPr lang="en-US" dirty="0"/>
-            <a:t> </a:t>
-          </a:r>
-          <a:r>
-            <a:rPr lang="en-US" dirty="0" err="1"/>
-            <a:t>Tekrar</a:t>
-          </a:r>
-          <a:endParaRPr lang="en-US" dirty="0"/>
         </a:p>
         <a:p>
           <a:r>
-            <a:rPr lang="en-US" dirty="0" err="1"/>
+            <a:rPr lang="en-US" dirty="0"/>
             <a:t>Çağrıldığında</a:t>
           </a:r>
-          <a:endParaRPr lang="en-US" dirty="0"/>
         </a:p>
       </dgm:t>
     </dgm:pt>
@@ -1297,33 +1261,15 @@
         <a:lstStyle/>
         <a:p>
           <a:r>
-            <a:rPr lang="en-US" dirty="0" err="1"/>
-            <a:t>Arka</a:t>
+            <a:rPr lang="en-US" dirty="0"/>
+            <a:t>Arka Plandan Tekrar</a:t>
           </a:r>
-          <a:r>
-            <a:rPr lang="en-US" dirty="0"/>
-            <a:t> </a:t>
-          </a:r>
-          <a:r>
-            <a:rPr lang="en-US" dirty="0" err="1"/>
-            <a:t>Plandan</a:t>
-          </a:r>
-          <a:r>
-            <a:rPr lang="en-US" dirty="0"/>
-            <a:t> </a:t>
-          </a:r>
-          <a:r>
-            <a:rPr lang="en-US" dirty="0" err="1"/>
-            <a:t>Tekrar</a:t>
-          </a:r>
-          <a:endParaRPr lang="en-US" dirty="0"/>
         </a:p>
         <a:p>
           <a:r>
-            <a:rPr lang="en-US" dirty="0" err="1"/>
+            <a:rPr lang="en-US" dirty="0"/>
             <a:t>Çağrıldığında</a:t>
           </a:r>
-          <a:endParaRPr lang="en-US" dirty="0"/>
         </a:p>
       </dgm:t>
     </dgm:pt>
@@ -1399,7 +1345,7 @@
       <dgm:spPr/>
     </dgm:pt>
     <dgm:pt modelId="{F964BA54-0222-4BB9-A120-041AFD771130}" type="pres">
-      <dgm:prSet presAssocID="{43618D93-E0CE-4E3A-B71E-9D45E1F21202}" presName="rootText3" presStyleLbl="asst1" presStyleIdx="0" presStyleCnt="3" custLinFactX="-100000" custLinFactNeighborX="-134699" custLinFactNeighborY="27468">
+      <dgm:prSet presAssocID="{43618D93-E0CE-4E3A-B71E-9D45E1F21202}" presName="rootText3" presStyleLbl="asst1" presStyleIdx="0" presStyleCnt="3" custLinFactX="-43425" custLinFactNeighborX="-100000" custLinFactNeighborY="24282">
         <dgm:presLayoutVars>
           <dgm:chPref val="3"/>
         </dgm:presLayoutVars>
@@ -1407,7 +1353,7 @@
       <dgm:spPr/>
     </dgm:pt>
     <dgm:pt modelId="{21033BD4-8C4C-4635-91AC-AE5C621D9A0F}" type="pres">
-      <dgm:prSet presAssocID="{43618D93-E0CE-4E3A-B71E-9D45E1F21202}" presName="titleText3" presStyleLbl="fgAcc2" presStyleIdx="0" presStyleCnt="3" custLinFactX="-63467" custLinFactNeighborX="-100000" custLinFactNeighborY="82417">
+      <dgm:prSet presAssocID="{43618D93-E0CE-4E3A-B71E-9D45E1F21202}" presName="titleText3" presStyleLbl="fgAcc2" presStyleIdx="0" presStyleCnt="3" custLinFactX="-63467" custLinFactNeighborX="-100000" custLinFactNeighborY="72858">
         <dgm:presLayoutVars>
           <dgm:chMax val="0"/>
           <dgm:chPref val="0"/>
@@ -1440,7 +1386,7 @@
       <dgm:spPr/>
     </dgm:pt>
     <dgm:pt modelId="{381E2B61-8D41-4B15-A4FA-8C8BDFF846D5}" type="pres">
-      <dgm:prSet presAssocID="{3554C381-6A22-435E-8E19-0CF86F67589F}" presName="rootText" presStyleLbl="node1" presStyleIdx="0" presStyleCnt="3" custLinFactX="-100000" custLinFactNeighborX="-134698" custLinFactNeighborY="38404">
+      <dgm:prSet presAssocID="{3554C381-6A22-435E-8E19-0CF86F67589F}" presName="rootText" presStyleLbl="node1" presStyleIdx="0" presStyleCnt="3" custLinFactX="-43425" custLinFactNeighborX="-100000" custLinFactNeighborY="30091">
         <dgm:presLayoutVars>
           <dgm:chMax/>
           <dgm:chPref val="3"/>
@@ -1449,7 +1395,7 @@
       <dgm:spPr/>
     </dgm:pt>
     <dgm:pt modelId="{0B6DD912-4296-4777-9666-3A8936D1FB0B}" type="pres">
-      <dgm:prSet presAssocID="{3554C381-6A22-435E-8E19-0CF86F67589F}" presName="titleText2" presStyleLbl="fgAcc1" presStyleIdx="0" presStyleCnt="3" custLinFactX="-67201" custLinFactY="15224" custLinFactNeighborX="-100000" custLinFactNeighborY="100000">
+      <dgm:prSet presAssocID="{3554C381-6A22-435E-8E19-0CF86F67589F}" presName="titleText2" presStyleLbl="fgAcc1" presStyleIdx="0" presStyleCnt="3" custLinFactX="-67201" custLinFactNeighborX="-100000" custLinFactNeighborY="90286">
         <dgm:presLayoutVars>
           <dgm:chMax val="0"/>
           <dgm:chPref val="0"/>
@@ -1490,7 +1436,7 @@
       <dgm:spPr/>
     </dgm:pt>
     <dgm:pt modelId="{1659CD6B-6E6F-48FB-9421-A817A6E9F084}" type="pres">
-      <dgm:prSet presAssocID="{E9DC3D6A-4957-423D-877D-3DBC7511009B}" presName="rootText3" presStyleLbl="asst1" presStyleIdx="1" presStyleCnt="3" custLinFactX="51508" custLinFactNeighborX="100000" custLinFactNeighborY="27468">
+      <dgm:prSet presAssocID="{E9DC3D6A-4957-423D-877D-3DBC7511009B}" presName="rootText3" presStyleLbl="asst1" presStyleIdx="1" presStyleCnt="3" custLinFactX="51508" custLinFactNeighborX="100000" custLinFactNeighborY="24178">
         <dgm:presLayoutVars>
           <dgm:chPref val="3"/>
         </dgm:presLayoutVars>
@@ -1498,7 +1444,7 @@
       <dgm:spPr/>
     </dgm:pt>
     <dgm:pt modelId="{FFD94A97-D8C4-4DB3-93FB-EBA35A3A2E7F}" type="pres">
-      <dgm:prSet presAssocID="{E9DC3D6A-4957-423D-877D-3DBC7511009B}" presName="titleText3" presStyleLbl="fgAcc2" presStyleIdx="1" presStyleCnt="3" custLinFactX="59893" custLinFactNeighborX="100000" custLinFactNeighborY="82417">
+      <dgm:prSet presAssocID="{E9DC3D6A-4957-423D-877D-3DBC7511009B}" presName="titleText3" presStyleLbl="fgAcc2" presStyleIdx="1" presStyleCnt="3" custLinFactX="59361" custLinFactNeighborX="100000" custLinFactNeighborY="72547">
         <dgm:presLayoutVars>
           <dgm:chMax val="0"/>
           <dgm:chPref val="0"/>
@@ -1531,7 +1477,7 @@
       <dgm:spPr/>
     </dgm:pt>
     <dgm:pt modelId="{65C90A22-6D19-48A5-AFE6-D0FA3E4B001D}" type="pres">
-      <dgm:prSet presAssocID="{887004FF-2EAA-46C5-BDFB-B113C91A639F}" presName="rootText" presStyleLbl="node1" presStyleIdx="1" presStyleCnt="3" custLinFactX="51508" custLinFactNeighborX="100000" custLinFactNeighborY="29558">
+      <dgm:prSet presAssocID="{887004FF-2EAA-46C5-BDFB-B113C91A639F}" presName="rootText" presStyleLbl="node1" presStyleIdx="1" presStyleCnt="3" custLinFactX="51508" custLinFactNeighborX="100000" custLinFactNeighborY="23229">
         <dgm:presLayoutVars>
           <dgm:chMax/>
           <dgm:chPref val="3"/>
@@ -1540,7 +1486,7 @@
       <dgm:spPr/>
     </dgm:pt>
     <dgm:pt modelId="{F0BC01C5-F246-4DCD-8487-ED65DA086B45}" type="pres">
-      <dgm:prSet presAssocID="{887004FF-2EAA-46C5-BDFB-B113C91A639F}" presName="titleText2" presStyleLbl="fgAcc1" presStyleIdx="1" presStyleCnt="3" custLinFactX="100000" custLinFactNeighborX="151294" custLinFactNeighborY="88688">
+      <dgm:prSet presAssocID="{887004FF-2EAA-46C5-BDFB-B113C91A639F}" presName="titleText2" presStyleLbl="fgAcc1" presStyleIdx="1" presStyleCnt="3" custLinFactX="59361" custLinFactNeighborX="100000" custLinFactNeighborY="69702">
         <dgm:presLayoutVars>
           <dgm:chMax val="0"/>
           <dgm:chPref val="0"/>
@@ -1581,7 +1527,7 @@
       <dgm:spPr/>
     </dgm:pt>
     <dgm:pt modelId="{9A036F7B-35C9-4D6C-BDB4-45E6D60CED37}" type="pres">
-      <dgm:prSet presAssocID="{2802B6F2-F2AC-4F52-9E69-79E031A00A3A}" presName="rootText3" presStyleLbl="asst1" presStyleIdx="2" presStyleCnt="3" custLinFactY="-100000" custLinFactNeighborX="64009" custLinFactNeighborY="-182828">
+      <dgm:prSet presAssocID="{2802B6F2-F2AC-4F52-9E69-79E031A00A3A}" presName="rootText3" presStyleLbl="asst1" presStyleIdx="2" presStyleCnt="3" custLinFactY="-100000" custLinFactNeighborX="64009" custLinFactNeighborY="-191274">
         <dgm:presLayoutVars>
           <dgm:chPref val="3"/>
         </dgm:presLayoutVars>
@@ -1589,7 +1535,7 @@
       <dgm:spPr/>
     </dgm:pt>
     <dgm:pt modelId="{F71B9FFD-88A1-406C-BD68-1465E4D4836E}" type="pres">
-      <dgm:prSet presAssocID="{2802B6F2-F2AC-4F52-9E69-79E031A00A3A}" presName="titleText3" presStyleLbl="fgAcc2" presStyleIdx="2" presStyleCnt="3" custLinFactY="-400000" custLinFactNeighborX="71121" custLinFactNeighborY="-448470">
+      <dgm:prSet presAssocID="{2802B6F2-F2AC-4F52-9E69-79E031A00A3A}" presName="titleText3" presStyleLbl="fgAcc2" presStyleIdx="2" presStyleCnt="3" custLinFactY="-400000" custLinFactNeighborX="71121" custLinFactNeighborY="-469061">
         <dgm:presLayoutVars>
           <dgm:chMax val="0"/>
           <dgm:chPref val="0"/>
@@ -1622,7 +1568,7 @@
       <dgm:spPr/>
     </dgm:pt>
     <dgm:pt modelId="{4C828307-1AA0-4B3F-870B-6E4B087D7431}" type="pres">
-      <dgm:prSet presAssocID="{032A223C-24D3-4C30-9CB1-C28719EA0115}" presName="rootText" presStyleLbl="node1" presStyleIdx="2" presStyleCnt="3" custLinFactY="-100000" custLinFactNeighborX="64172" custLinFactNeighborY="-177152">
+      <dgm:prSet presAssocID="{032A223C-24D3-4C30-9CB1-C28719EA0115}" presName="rootText" presStyleLbl="node1" presStyleIdx="2" presStyleCnt="3" custLinFactY="-100000" custLinFactNeighborX="64172" custLinFactNeighborY="-185464">
         <dgm:presLayoutVars>
           <dgm:chMax/>
           <dgm:chPref val="3"/>
@@ -1631,7 +1577,7 @@
       <dgm:spPr/>
     </dgm:pt>
     <dgm:pt modelId="{B041848E-FA0B-427D-8FCC-2276F02E03B2}" type="pres">
-      <dgm:prSet presAssocID="{032A223C-24D3-4C30-9CB1-C28719EA0115}" presName="titleText2" presStyleLbl="fgAcc1" presStyleIdx="2" presStyleCnt="3" custLinFactY="-400000" custLinFactNeighborX="71304" custLinFactNeighborY="-431443">
+      <dgm:prSet presAssocID="{032A223C-24D3-4C30-9CB1-C28719EA0115}" presName="titleText2" presStyleLbl="fgAcc1" presStyleIdx="2" presStyleCnt="3" custLinFactY="-400000" custLinFactNeighborX="71304" custLinFactNeighborY="-456380">
         <dgm:presLayoutVars>
           <dgm:chMax val="0"/>
           <dgm:chPref val="0"/>
@@ -1773,8 +1719,8 @@
       </dsp:nvSpPr>
       <dsp:spPr>
         <a:xfrm>
-          <a:off x="5178887" y="3056924"/>
-          <a:ext cx="91440" cy="666761"/>
+          <a:off x="5178887" y="2968175"/>
+          <a:ext cx="91440" cy="668169"/>
         </a:xfrm>
         <a:custGeom>
           <a:avLst/>
@@ -1788,13 +1734,13 @@
                 <a:pt x="45720" y="0"/>
               </a:moveTo>
               <a:lnTo>
-                <a:pt x="45720" y="421578"/>
+                <a:pt x="45720" y="422986"/>
               </a:lnTo>
               <a:lnTo>
-                <a:pt x="49028" y="421578"/>
+                <a:pt x="49028" y="422986"/>
               </a:lnTo>
               <a:lnTo>
-                <a:pt x="49028" y="666761"/>
+                <a:pt x="49028" y="668169"/>
               </a:lnTo>
             </a:path>
           </a:pathLst>
@@ -1835,7 +1781,7 @@
       <dsp:spPr>
         <a:xfrm>
           <a:off x="5286953" y="1055127"/>
-          <a:ext cx="952402" cy="1476406"/>
+          <a:ext cx="952402" cy="1387656"/>
         </a:xfrm>
         <a:custGeom>
           <a:avLst/>
@@ -1849,7 +1795,7 @@
                 <a:pt x="0" y="0"/>
               </a:moveTo>
               <a:lnTo>
-                <a:pt x="952402" y="1476406"/>
+                <a:pt x="952402" y="1387656"/>
               </a:lnTo>
             </a:path>
           </a:pathLst>
@@ -1889,8 +1835,8 @@
       </dsp:nvSpPr>
       <dsp:spPr>
         <a:xfrm>
-          <a:off x="9677486" y="3001658"/>
-          <a:ext cx="91440" cy="629080"/>
+          <a:off x="9677486" y="2967087"/>
+          <a:ext cx="91440" cy="597147"/>
         </a:xfrm>
         <a:custGeom>
           <a:avLst/>
@@ -1904,7 +1850,7 @@
                 <a:pt x="45720" y="0"/>
               </a:moveTo>
               <a:lnTo>
-                <a:pt x="45720" y="629080"/>
+                <a:pt x="45720" y="597147"/>
               </a:lnTo>
             </a:path>
           </a:pathLst>
@@ -1945,7 +1891,7 @@
       <dsp:spPr>
         <a:xfrm>
           <a:off x="5286953" y="1055127"/>
-          <a:ext cx="3421505" cy="1421139"/>
+          <a:ext cx="3421505" cy="1386568"/>
         </a:xfrm>
         <a:custGeom>
           <a:avLst/>
@@ -1959,10 +1905,10 @@
                 <a:pt x="0" y="0"/>
               </a:moveTo>
               <a:lnTo>
-                <a:pt x="0" y="1421139"/>
+                <a:pt x="0" y="1386568"/>
               </a:lnTo>
               <a:lnTo>
-                <a:pt x="3421505" y="1421139"/>
+                <a:pt x="3421505" y="1386568"/>
               </a:lnTo>
             </a:path>
           </a:pathLst>
@@ -2002,8 +1948,8 @@
       </dsp:nvSpPr>
       <dsp:spPr>
         <a:xfrm>
-          <a:off x="969027" y="3001658"/>
-          <a:ext cx="91440" cy="722032"/>
+          <a:off x="969027" y="2968180"/>
+          <a:ext cx="91440" cy="668159"/>
         </a:xfrm>
         <a:custGeom>
           <a:avLst/>
@@ -2017,7 +1963,7 @@
                 <a:pt x="45720" y="0"/>
               </a:moveTo>
               <a:lnTo>
-                <a:pt x="45720" y="722032"/>
+                <a:pt x="45720" y="668159"/>
               </a:lnTo>
             </a:path>
           </a:pathLst>
@@ -2058,7 +2004,7 @@
       <dsp:spPr>
         <a:xfrm>
           <a:off x="2029495" y="1055127"/>
-          <a:ext cx="3257457" cy="1421139"/>
+          <a:ext cx="3257457" cy="1387661"/>
         </a:xfrm>
         <a:custGeom>
           <a:avLst/>
@@ -2072,10 +2018,10 @@
                 <a:pt x="3257457" y="0"/>
               </a:moveTo>
               <a:lnTo>
-                <a:pt x="3257457" y="1421139"/>
+                <a:pt x="3257457" y="1387661"/>
               </a:lnTo>
               <a:lnTo>
-                <a:pt x="0" y="1421139"/>
+                <a:pt x="0" y="1387661"/>
               </a:lnTo>
             </a:path>
           </a:pathLst>
@@ -2284,7 +2230,7 @@
       </dsp:nvSpPr>
       <dsp:spPr>
         <a:xfrm>
-          <a:off x="0" y="1950875"/>
+          <a:off x="0" y="1917397"/>
           <a:ext cx="2029495" cy="1050782"/>
         </a:xfrm>
         <a:prstGeom prst="rect">
@@ -2365,7 +2311,7 @@
         </a:p>
       </dsp:txBody>
       <dsp:txXfrm>
-        <a:off x="0" y="1950875"/>
+        <a:off x="0" y="1917397"/>
         <a:ext cx="2029495" cy="1050782"/>
       </dsp:txXfrm>
     </dsp:sp>
@@ -2376,7 +2322,7 @@
       </dsp:nvSpPr>
       <dsp:spPr>
         <a:xfrm>
-          <a:off x="330899" y="2768196"/>
+          <a:off x="330899" y="2734715"/>
           <a:ext cx="1826546" cy="350260"/>
         </a:xfrm>
         <a:prstGeom prst="rect">
@@ -2442,7 +2388,7 @@
         </a:p>
       </dsp:txBody>
       <dsp:txXfrm>
-        <a:off x="330899" y="2768196"/>
+        <a:off x="330899" y="2734715"/>
         <a:ext cx="1826546" cy="350260"/>
       </dsp:txXfrm>
     </dsp:sp>
@@ -2453,7 +2399,7 @@
       </dsp:nvSpPr>
       <dsp:spPr>
         <a:xfrm>
-          <a:off x="0" y="3723690"/>
+          <a:off x="0" y="3636339"/>
           <a:ext cx="2029495" cy="1050782"/>
         </a:xfrm>
         <a:prstGeom prst="rect">
@@ -2534,7 +2480,7 @@
         </a:p>
       </dsp:txBody>
       <dsp:txXfrm>
-        <a:off x="0" y="3723690"/>
+        <a:off x="0" y="3636339"/>
         <a:ext cx="2029495" cy="1050782"/>
       </dsp:txXfrm>
     </dsp:sp>
@@ -2545,7 +2491,7 @@
       </dsp:nvSpPr>
       <dsp:spPr>
         <a:xfrm>
-          <a:off x="262695" y="4541008"/>
+          <a:off x="262695" y="4453660"/>
           <a:ext cx="1826546" cy="350260"/>
         </a:xfrm>
         <a:prstGeom prst="rect">
@@ -2604,26 +2550,9 @@
             <a:buNone/>
           </a:pPr>
           <a:r>
-            <a:rPr lang="en-US" sz="1000" kern="1200" dirty="0" err="1"/>
-            <a:t>Arka</a:t>
+            <a:rPr lang="en-US" sz="1000" kern="1200" dirty="0"/>
+            <a:t>Arka Plandan Tekrar</a:t>
           </a:r>
-          <a:r>
-            <a:rPr lang="en-US" sz="1000" kern="1200" dirty="0"/>
-            <a:t> </a:t>
-          </a:r>
-          <a:r>
-            <a:rPr lang="en-US" sz="1000" kern="1200" dirty="0" err="1"/>
-            <a:t>Plandan</a:t>
-          </a:r>
-          <a:r>
-            <a:rPr lang="en-US" sz="1000" kern="1200" dirty="0"/>
-            <a:t> </a:t>
-          </a:r>
-          <a:r>
-            <a:rPr lang="en-US" sz="1000" kern="1200" dirty="0" err="1"/>
-            <a:t>Tekrar</a:t>
-          </a:r>
-          <a:endParaRPr lang="en-US" sz="1000" kern="1200" dirty="0"/>
         </a:p>
         <a:p>
           <a:pPr marL="0" lvl="0" indent="0" algn="r" defTabSz="444500">
@@ -2639,14 +2568,13 @@
             <a:buNone/>
           </a:pPr>
           <a:r>
-            <a:rPr lang="en-US" sz="1000" kern="1200" dirty="0" err="1"/>
+            <a:rPr lang="en-US" sz="1000" kern="1200" dirty="0"/>
             <a:t>Çağrıldığında</a:t>
           </a:r>
-          <a:endParaRPr lang="en-US" sz="1000" kern="1200" dirty="0"/>
         </a:p>
       </dsp:txBody>
       <dsp:txXfrm>
-        <a:off x="262695" y="4541008"/>
+        <a:off x="262695" y="4453660"/>
         <a:ext cx="1826546" cy="350260"/>
       </dsp:txXfrm>
     </dsp:sp>
@@ -2657,7 +2585,7 @@
       </dsp:nvSpPr>
       <dsp:spPr>
         <a:xfrm>
-          <a:off x="8708459" y="1950875"/>
+          <a:off x="8708459" y="1916304"/>
           <a:ext cx="2029495" cy="1050782"/>
         </a:xfrm>
         <a:prstGeom prst="rect">
@@ -2731,7 +2659,7 @@
         </a:p>
       </dsp:txBody>
       <dsp:txXfrm>
-        <a:off x="8708459" y="1950875"/>
+        <a:off x="8708459" y="1916304"/>
         <a:ext cx="2029495" cy="1050782"/>
       </dsp:txXfrm>
     </dsp:sp>
@@ -2742,7 +2670,7 @@
       </dsp:nvSpPr>
       <dsp:spPr>
         <a:xfrm>
-          <a:off x="8950309" y="2768196"/>
+          <a:off x="8950309" y="2733625"/>
           <a:ext cx="1826546" cy="350260"/>
         </a:xfrm>
         <a:prstGeom prst="rect">
@@ -2808,7 +2736,7 @@
         </a:p>
       </dsp:txBody>
       <dsp:txXfrm>
-        <a:off x="8950309" y="2768196"/>
+        <a:off x="8950309" y="2733625"/>
         <a:ext cx="1826546" cy="350260"/>
       </dsp:txXfrm>
     </dsp:sp>
@@ -2819,7 +2747,7 @@
       </dsp:nvSpPr>
       <dsp:spPr>
         <a:xfrm>
-          <a:off x="8708459" y="3630738"/>
+          <a:off x="8708459" y="3564234"/>
           <a:ext cx="2029495" cy="1050782"/>
         </a:xfrm>
         <a:prstGeom prst="rect">
@@ -2900,7 +2828,7 @@
         </a:p>
       </dsp:txBody>
       <dsp:txXfrm>
-        <a:off x="8708459" y="3630738"/>
+        <a:off x="8708459" y="3564234"/>
         <a:ext cx="2029495" cy="1050782"/>
       </dsp:txXfrm>
     </dsp:sp>
@@ -2911,7 +2839,7 @@
       </dsp:nvSpPr>
       <dsp:spPr>
         <a:xfrm>
-          <a:off x="8950309" y="4448063"/>
+          <a:off x="8950309" y="4381562"/>
           <a:ext cx="1826546" cy="350260"/>
         </a:xfrm>
         <a:prstGeom prst="rect">
@@ -2970,26 +2898,9 @@
             <a:buNone/>
           </a:pPr>
           <a:r>
-            <a:rPr lang="en-US" sz="1000" kern="1200" dirty="0" err="1"/>
-            <a:t>Arka</a:t>
+            <a:rPr lang="en-US" sz="1000" kern="1200" dirty="0"/>
+            <a:t>Arka Plandan Tekrar</a:t>
           </a:r>
-          <a:r>
-            <a:rPr lang="en-US" sz="1000" kern="1200" dirty="0"/>
-            <a:t> </a:t>
-          </a:r>
-          <a:r>
-            <a:rPr lang="en-US" sz="1000" kern="1200" dirty="0" err="1"/>
-            <a:t>Plandan</a:t>
-          </a:r>
-          <a:r>
-            <a:rPr lang="en-US" sz="1000" kern="1200" dirty="0"/>
-            <a:t> </a:t>
-          </a:r>
-          <a:r>
-            <a:rPr lang="en-US" sz="1000" kern="1200" dirty="0" err="1"/>
-            <a:t>Tekrar</a:t>
-          </a:r>
-          <a:endParaRPr lang="en-US" sz="1000" kern="1200" dirty="0"/>
         </a:p>
         <a:p>
           <a:pPr marL="0" lvl="0" indent="0" algn="r" defTabSz="444500">
@@ -3005,14 +2916,13 @@
             <a:buNone/>
           </a:pPr>
           <a:r>
-            <a:rPr lang="en-US" sz="1000" kern="1200" dirty="0" err="1"/>
+            <a:rPr lang="en-US" sz="1000" kern="1200" dirty="0"/>
             <a:t>Çağrıldığında</a:t>
           </a:r>
-          <a:endParaRPr lang="en-US" sz="1000" kern="1200" dirty="0"/>
         </a:p>
       </dsp:txBody>
       <dsp:txXfrm>
-        <a:off x="8950309" y="4448063"/>
+        <a:off x="8950309" y="4381562"/>
         <a:ext cx="1826546" cy="350260"/>
       </dsp:txXfrm>
     </dsp:sp>
@@ -3023,7 +2933,7 @@
       </dsp:nvSpPr>
       <dsp:spPr>
         <a:xfrm>
-          <a:off x="4209859" y="2006141"/>
+          <a:off x="4209859" y="1917392"/>
           <a:ext cx="2029495" cy="1050782"/>
         </a:xfrm>
         <a:prstGeom prst="rect">
@@ -3097,7 +3007,7 @@
         </a:p>
       </dsp:txBody>
       <dsp:txXfrm>
-        <a:off x="4209859" y="2006141"/>
+        <a:off x="4209859" y="1917392"/>
         <a:ext cx="2029495" cy="1050782"/>
       </dsp:txXfrm>
     </dsp:sp>
@@ -3108,7 +3018,7 @@
       </dsp:nvSpPr>
       <dsp:spPr>
         <a:xfrm>
-          <a:off x="4615757" y="2823466"/>
+          <a:off x="4615757" y="2751344"/>
           <a:ext cx="1826546" cy="350260"/>
         </a:xfrm>
         <a:prstGeom prst="rect">
@@ -3174,7 +3084,7 @@
         </a:p>
       </dsp:txBody>
       <dsp:txXfrm>
-        <a:off x="4615757" y="2823466"/>
+        <a:off x="4615757" y="2751344"/>
         <a:ext cx="1826546" cy="350260"/>
       </dsp:txXfrm>
     </dsp:sp>
@@ -3185,7 +3095,7 @@
       </dsp:nvSpPr>
       <dsp:spPr>
         <a:xfrm>
-          <a:off x="4213168" y="3723686"/>
+          <a:off x="4213168" y="3636345"/>
           <a:ext cx="2029495" cy="1050782"/>
         </a:xfrm>
         <a:prstGeom prst="rect">
@@ -3266,7 +3176,7 @@
         </a:p>
       </dsp:txBody>
       <dsp:txXfrm>
-        <a:off x="4213168" y="3723686"/>
+        <a:off x="4213168" y="3636345"/>
         <a:ext cx="2029495" cy="1050782"/>
       </dsp:txXfrm>
     </dsp:sp>
@@ -3277,7 +3187,7 @@
       </dsp:nvSpPr>
       <dsp:spPr>
         <a:xfrm>
-          <a:off x="4619099" y="4541007"/>
+          <a:off x="4619099" y="4453662"/>
           <a:ext cx="1826546" cy="350260"/>
         </a:xfrm>
         <a:prstGeom prst="rect">
@@ -3336,26 +3246,9 @@
             <a:buNone/>
           </a:pPr>
           <a:r>
-            <a:rPr lang="en-US" sz="1000" kern="1200" dirty="0" err="1"/>
-            <a:t>Arka</a:t>
+            <a:rPr lang="en-US" sz="1000" kern="1200" dirty="0"/>
+            <a:t>Arka Plandan Tekrar</a:t>
           </a:r>
-          <a:r>
-            <a:rPr lang="en-US" sz="1000" kern="1200" dirty="0"/>
-            <a:t> </a:t>
-          </a:r>
-          <a:r>
-            <a:rPr lang="en-US" sz="1000" kern="1200" dirty="0" err="1"/>
-            <a:t>Plandan</a:t>
-          </a:r>
-          <a:r>
-            <a:rPr lang="en-US" sz="1000" kern="1200" dirty="0"/>
-            <a:t> </a:t>
-          </a:r>
-          <a:r>
-            <a:rPr lang="en-US" sz="1000" kern="1200" dirty="0" err="1"/>
-            <a:t>Tekrar</a:t>
-          </a:r>
-          <a:endParaRPr lang="en-US" sz="1000" kern="1200" dirty="0"/>
         </a:p>
         <a:p>
           <a:pPr marL="0" lvl="0" indent="0" algn="r" defTabSz="444500">
@@ -3371,14 +3264,13 @@
             <a:buNone/>
           </a:pPr>
           <a:r>
-            <a:rPr lang="en-US" sz="1000" kern="1200" dirty="0" err="1"/>
+            <a:rPr lang="en-US" sz="1000" kern="1200" dirty="0"/>
             <a:t>Çağrıldığında</a:t>
           </a:r>
-          <a:endParaRPr lang="en-US" sz="1000" kern="1200" dirty="0"/>
         </a:p>
       </dsp:txBody>
       <dsp:txXfrm>
-        <a:off x="4619099" y="4541007"/>
+        <a:off x="4619099" y="4453662"/>
         <a:ext cx="1826546" cy="350260"/>
       </dsp:txXfrm>
     </dsp:sp>
@@ -6923,10 +6815,9 @@
           </a:lstStyle>
           <a:p>
             <a:r>
-              <a:rPr lang="en-US"/>
+              <a:rPr lang="en-US" dirty="0"/>
               <a:t>Click icon to add picture</a:t>
             </a:r>
-            <a:endParaRPr lang="en-US" dirty="0"/>
           </a:p>
         </p:txBody>
       </p:sp>
@@ -11064,10 +10955,9 @@
           </a:lstStyle>
           <a:p>
             <a:r>
-              <a:rPr lang="en-US"/>
+              <a:rPr lang="en-US" dirty="0"/>
               <a:t>Click icon to add picture</a:t>
             </a:r>
-            <a:endParaRPr lang="en-US" dirty="0"/>
           </a:p>
         </p:txBody>
       </p:sp>
@@ -11284,10 +11174,9 @@
           </a:lstStyle>
           <a:p>
             <a:r>
-              <a:rPr lang="en-US"/>
+              <a:rPr lang="en-US" dirty="0"/>
               <a:t>Click icon to add picture</a:t>
             </a:r>
-            <a:endParaRPr lang="en-US" dirty="0"/>
           </a:p>
         </p:txBody>
       </p:sp>
@@ -11504,10 +11393,9 @@
           </a:lstStyle>
           <a:p>
             <a:r>
-              <a:rPr lang="en-US"/>
+              <a:rPr lang="en-US" dirty="0"/>
               <a:t>Click icon to add picture</a:t>
             </a:r>
-            <a:endParaRPr lang="en-US" dirty="0"/>
           </a:p>
         </p:txBody>
       </p:sp>
@@ -17031,10 +16919,9 @@
               <a:buNone/>
             </a:pPr>
             <a:r>
-              <a:rPr lang="en-US"/>
+              <a:rPr lang="en-US" dirty="0"/>
               <a:t>Click icon to add picture</a:t>
             </a:r>
-            <a:endParaRPr lang="en-US" dirty="0"/>
           </a:p>
         </p:txBody>
       </p:sp>
@@ -18749,19 +18636,7 @@
           <a:p>
             <a:r>
               <a:rPr lang="en-US" dirty="0"/>
-              <a:t>• UI – Android </a:t>
-            </a:r>
-            <a:r>
-              <a:rPr lang="en-US" dirty="0" err="1"/>
-              <a:t>Yaşam</a:t>
-            </a:r>
-            <a:r>
-              <a:rPr lang="en-US" dirty="0"/>
-              <a:t> </a:t>
-            </a:r>
-            <a:r>
-              <a:rPr lang="en-US" dirty="0" err="1"/>
-              <a:t>Döngüsü</a:t>
+              <a:t>• UI – Android Yaşam Döngüsü</a:t>
             </a:r>
             <a:endParaRPr lang="tr-TR" dirty="0"/>
           </a:p>
@@ -18836,12 +18711,8 @@
           <a:lstStyle/>
           <a:p>
             <a:r>
-              <a:rPr lang="en-US" dirty="0" err="1"/>
-              <a:t>ViewPager</a:t>
-            </a:r>
-            <a:r>
               <a:rPr lang="en-US" dirty="0"/>
-              <a:t> </a:t>
+              <a:t>ViewPager </a:t>
             </a:r>
             <a:r>
               <a:rPr lang="tr-TR" dirty="0"/>
@@ -19184,21 +19055,8 @@
                   <a:schemeClr val="tx1"/>
                 </a:solidFill>
               </a:rPr>
-              <a:t>Destek tabanlı Fragment’ları kullanmak isteyen Activity’ler için </a:t>
+              <a:t>Destek tabanlı Fragment’ları kullanmak isteyen Activity’ler için temel sınıf.</a:t>
             </a:r>
-            <a:r>
-              <a:rPr lang="tr-TR" i="1">
-                <a:solidFill>
-                  <a:schemeClr val="tx1"/>
-                </a:solidFill>
-              </a:rPr>
-              <a:t>temel sınıf.</a:t>
-            </a:r>
-            <a:endParaRPr lang="tr-TR" i="1" dirty="0">
-              <a:solidFill>
-                <a:schemeClr val="tx1"/>
-              </a:solidFill>
-            </a:endParaRPr>
           </a:p>
           <a:p>
             <a:r>
@@ -19343,20 +19201,12 @@
           </a:p>
           <a:p>
             <a:r>
-              <a:rPr lang="en-US" b="1" dirty="0" err="1">
-                <a:solidFill>
-                  <a:schemeClr val="tx1"/>
-                </a:solidFill>
-              </a:rPr>
-              <a:t>onPageScrolled</a:t>
-            </a:r>
-            <a:r>
               <a:rPr lang="en-US" b="1" dirty="0">
                 <a:solidFill>
                   <a:schemeClr val="tx1"/>
                 </a:solidFill>
               </a:rPr>
-              <a:t>() </a:t>
+              <a:t>onPageScrolled() </a:t>
             </a:r>
             <a:r>
               <a:rPr lang="en-US" dirty="0">
@@ -19377,20 +19227,12 @@
           </a:p>
           <a:p>
             <a:r>
-              <a:rPr lang="en-US" b="1" dirty="0" err="1">
-                <a:solidFill>
-                  <a:schemeClr val="tx1"/>
-                </a:solidFill>
-              </a:rPr>
-              <a:t>onPageSelected</a:t>
-            </a:r>
-            <a:r>
               <a:rPr lang="en-US" b="1" dirty="0">
                 <a:solidFill>
                   <a:schemeClr val="tx1"/>
                 </a:solidFill>
               </a:rPr>
-              <a:t>() </a:t>
+              <a:t>onPageSelected() </a:t>
             </a:r>
             <a:r>
               <a:rPr lang="en-US" dirty="0">
@@ -19416,20 +19258,12 @@
           </a:p>
           <a:p>
             <a:r>
-              <a:rPr lang="en-US" b="1" dirty="0" err="1">
-                <a:solidFill>
-                  <a:schemeClr val="tx1"/>
-                </a:solidFill>
-              </a:rPr>
-              <a:t>onPageScrollStateChanged</a:t>
-            </a:r>
-            <a:r>
               <a:rPr lang="en-US" b="1" dirty="0">
                 <a:solidFill>
                   <a:schemeClr val="tx1"/>
                 </a:solidFill>
               </a:rPr>
-              <a:t>() </a:t>
+              <a:t>onPageScrollStateChanged() </a:t>
             </a:r>
             <a:r>
               <a:rPr lang="en-US" dirty="0">
@@ -19638,10 +19472,9 @@
               <a:t>İ</a:t>
             </a:r>
             <a:r>
-              <a:rPr lang="en-US" dirty="0" err="1"/>
+              <a:rPr lang="en-US" dirty="0"/>
               <a:t>lişkisi</a:t>
             </a:r>
-            <a:endParaRPr lang="en-US" dirty="0"/>
           </a:p>
         </p:txBody>
       </p:sp>
@@ -19943,183 +19776,7 @@
                   <a:schemeClr val="tx1"/>
                 </a:solidFill>
               </a:rPr>
-              <a:t>, </a:t>
-            </a:r>
-            <a:r>
-              <a:rPr lang="en-US" sz="1600" dirty="0" err="1">
-                <a:solidFill>
-                  <a:schemeClr val="tx1"/>
-                </a:solidFill>
-              </a:rPr>
-              <a:t>arka</a:t>
-            </a:r>
-            <a:r>
-              <a:rPr lang="en-US" sz="1600" dirty="0">
-                <a:solidFill>
-                  <a:schemeClr val="tx1"/>
-                </a:solidFill>
-              </a:rPr>
-              <a:t> </a:t>
-            </a:r>
-            <a:r>
-              <a:rPr lang="en-US" sz="1600" dirty="0" err="1">
-                <a:solidFill>
-                  <a:schemeClr val="tx1"/>
-                </a:solidFill>
-              </a:rPr>
-              <a:t>planda</a:t>
-            </a:r>
-            <a:r>
-              <a:rPr lang="en-US" sz="1600" dirty="0">
-                <a:solidFill>
-                  <a:schemeClr val="tx1"/>
-                </a:solidFill>
-              </a:rPr>
-              <a:t> </a:t>
-            </a:r>
-            <a:r>
-              <a:rPr lang="en-US" sz="1600" dirty="0" err="1">
-                <a:solidFill>
-                  <a:schemeClr val="tx1"/>
-                </a:solidFill>
-              </a:rPr>
-              <a:t>çalışan</a:t>
-            </a:r>
-            <a:r>
-              <a:rPr lang="en-US" sz="1600" dirty="0">
-                <a:solidFill>
-                  <a:schemeClr val="tx1"/>
-                </a:solidFill>
-              </a:rPr>
-              <a:t> </a:t>
-            </a:r>
-            <a:r>
-              <a:rPr lang="en-US" sz="1600" dirty="0" err="1">
-                <a:solidFill>
-                  <a:schemeClr val="tx1"/>
-                </a:solidFill>
-              </a:rPr>
-              <a:t>kotlin</a:t>
-            </a:r>
-            <a:r>
-              <a:rPr lang="en-US" sz="1600" dirty="0">
-                <a:solidFill>
-                  <a:schemeClr val="tx1"/>
-                </a:solidFill>
-              </a:rPr>
-              <a:t> </a:t>
-            </a:r>
-            <a:r>
-              <a:rPr lang="en-US" sz="1600" dirty="0" err="1">
-                <a:solidFill>
-                  <a:schemeClr val="tx1"/>
-                </a:solidFill>
-              </a:rPr>
-              <a:t>kodlarıdır</a:t>
-            </a:r>
-            <a:r>
-              <a:rPr lang="en-US" sz="1600" dirty="0">
-                <a:solidFill>
-                  <a:schemeClr val="tx1"/>
-                </a:solidFill>
-              </a:rPr>
-              <a:t>. Her </a:t>
-            </a:r>
-            <a:r>
-              <a:rPr lang="en-US" sz="1600" dirty="0" err="1">
-                <a:solidFill>
-                  <a:schemeClr val="tx1"/>
-                </a:solidFill>
-              </a:rPr>
-              <a:t>bir</a:t>
-            </a:r>
-            <a:r>
-              <a:rPr lang="en-US" sz="1600" dirty="0">
-                <a:solidFill>
-                  <a:schemeClr val="tx1"/>
-                </a:solidFill>
-              </a:rPr>
-              <a:t> </a:t>
-            </a:r>
-            <a:r>
-              <a:rPr lang="en-US" sz="1600" dirty="0" err="1">
-                <a:solidFill>
-                  <a:schemeClr val="tx1"/>
-                </a:solidFill>
-              </a:rPr>
-              <a:t>activity’nin</a:t>
-            </a:r>
-            <a:r>
-              <a:rPr lang="en-US" sz="1600" dirty="0">
-                <a:solidFill>
-                  <a:schemeClr val="tx1"/>
-                </a:solidFill>
-              </a:rPr>
-              <a:t> </a:t>
-            </a:r>
-            <a:r>
-              <a:rPr lang="en-US" sz="1600" dirty="0" err="1">
-                <a:solidFill>
-                  <a:schemeClr val="tx1"/>
-                </a:solidFill>
-              </a:rPr>
-              <a:t>bir</a:t>
-            </a:r>
-            <a:r>
-              <a:rPr lang="en-US" sz="1600" dirty="0">
-                <a:solidFill>
-                  <a:schemeClr val="tx1"/>
-                </a:solidFill>
-              </a:rPr>
-              <a:t> </a:t>
-            </a:r>
-            <a:r>
-              <a:rPr lang="en-US" sz="1600" dirty="0" err="1">
-                <a:solidFill>
-                  <a:schemeClr val="tx1"/>
-                </a:solidFill>
-              </a:rPr>
-              <a:t>layout’u</a:t>
-            </a:r>
-            <a:r>
-              <a:rPr lang="en-US" sz="1600" dirty="0">
-                <a:solidFill>
-                  <a:schemeClr val="tx1"/>
-                </a:solidFill>
-              </a:rPr>
-              <a:t> </a:t>
-            </a:r>
-            <a:r>
-              <a:rPr lang="en-US" sz="1600" dirty="0" err="1">
-                <a:solidFill>
-                  <a:schemeClr val="tx1"/>
-                </a:solidFill>
-              </a:rPr>
-              <a:t>olmak</a:t>
-            </a:r>
-            <a:r>
-              <a:rPr lang="en-US" sz="1600" dirty="0">
-                <a:solidFill>
-                  <a:schemeClr val="tx1"/>
-                </a:solidFill>
-              </a:rPr>
-              <a:t> </a:t>
-            </a:r>
-            <a:r>
-              <a:rPr lang="en-US" sz="1600" dirty="0" err="1">
-                <a:solidFill>
-                  <a:schemeClr val="tx1"/>
-                </a:solidFill>
-              </a:rPr>
-              <a:t>zorundadır</a:t>
-            </a:r>
-            <a:r>
-              <a:rPr lang="en-US" sz="1600" dirty="0">
-                <a:solidFill>
-                  <a:schemeClr val="tx1"/>
-                </a:solidFill>
-              </a:rPr>
-              <a:t>.</a:t>
+              <a:t>, arka planda çalışan kotlin kodlarıdır. Her bir activity’nin bir layout’u olmak zorundadır.</a:t>
             </a:r>
           </a:p>
           <a:p>
@@ -20137,119 +19794,7 @@
                   <a:schemeClr val="tx1"/>
                 </a:solidFill>
               </a:rPr>
-              <a:t>, </a:t>
-            </a:r>
-            <a:r>
-              <a:rPr lang="en-US" sz="1600" dirty="0" err="1">
-                <a:solidFill>
-                  <a:schemeClr val="tx1"/>
-                </a:solidFill>
-              </a:rPr>
-              <a:t>View’leri</a:t>
-            </a:r>
-            <a:r>
-              <a:rPr lang="en-US" sz="1600" dirty="0">
-                <a:solidFill>
-                  <a:schemeClr val="tx1"/>
-                </a:solidFill>
-              </a:rPr>
-              <a:t> </a:t>
-            </a:r>
-            <a:r>
-              <a:rPr lang="en-US" sz="1600" dirty="0" err="1">
-                <a:solidFill>
-                  <a:schemeClr val="tx1"/>
-                </a:solidFill>
-              </a:rPr>
-              <a:t>tutmaktadır</a:t>
-            </a:r>
-            <a:r>
-              <a:rPr lang="en-US" sz="1600" dirty="0">
-                <a:solidFill>
-                  <a:schemeClr val="tx1"/>
-                </a:solidFill>
-              </a:rPr>
-              <a:t> </a:t>
-            </a:r>
-            <a:r>
-              <a:rPr lang="en-US" sz="1600" dirty="0" err="1">
-                <a:solidFill>
-                  <a:schemeClr val="tx1"/>
-                </a:solidFill>
-              </a:rPr>
-              <a:t>ve</a:t>
-            </a:r>
-            <a:r>
-              <a:rPr lang="en-US" sz="1600" dirty="0">
-                <a:solidFill>
-                  <a:schemeClr val="tx1"/>
-                </a:solidFill>
-              </a:rPr>
-              <a:t> </a:t>
-            </a:r>
-            <a:r>
-              <a:rPr lang="en-US" sz="1600" dirty="0" err="1">
-                <a:solidFill>
-                  <a:schemeClr val="tx1"/>
-                </a:solidFill>
-              </a:rPr>
-              <a:t>Activity’nin</a:t>
-            </a:r>
-            <a:r>
-              <a:rPr lang="en-US" sz="1600" dirty="0">
-                <a:solidFill>
-                  <a:schemeClr val="tx1"/>
-                </a:solidFill>
-              </a:rPr>
-              <a:t> </a:t>
-            </a:r>
-            <a:r>
-              <a:rPr lang="en-US" sz="1600" dirty="0" err="1">
-                <a:solidFill>
-                  <a:schemeClr val="tx1"/>
-                </a:solidFill>
-              </a:rPr>
-              <a:t>sayfa</a:t>
-            </a:r>
-            <a:r>
-              <a:rPr lang="en-US" sz="1600" dirty="0">
-                <a:solidFill>
-                  <a:schemeClr val="tx1"/>
-                </a:solidFill>
-              </a:rPr>
-              <a:t> </a:t>
-            </a:r>
-            <a:r>
-              <a:rPr lang="en-US" sz="1600" dirty="0" err="1">
-                <a:solidFill>
-                  <a:schemeClr val="tx1"/>
-                </a:solidFill>
-              </a:rPr>
-              <a:t>tasarımını</a:t>
-            </a:r>
-            <a:r>
-              <a:rPr lang="en-US" sz="1600" dirty="0">
-                <a:solidFill>
-                  <a:schemeClr val="tx1"/>
-                </a:solidFill>
-              </a:rPr>
-              <a:t> </a:t>
-            </a:r>
-            <a:r>
-              <a:rPr lang="en-US" sz="1600" dirty="0" err="1">
-                <a:solidFill>
-                  <a:schemeClr val="tx1"/>
-                </a:solidFill>
-              </a:rPr>
-              <a:t>oluşturur</a:t>
-            </a:r>
-            <a:r>
-              <a:rPr lang="en-US" sz="1600" dirty="0">
-                <a:solidFill>
-                  <a:schemeClr val="tx1"/>
-                </a:solidFill>
-              </a:rPr>
-              <a:t>.</a:t>
+              <a:t>, View’leri tutmaktadır ve Activity’nin sayfa tasarımını oluşturur.</a:t>
             </a:r>
           </a:p>
           <a:p>
@@ -20267,71 +19812,7 @@
                   <a:schemeClr val="tx1"/>
                 </a:solidFill>
               </a:rPr>
-              <a:t>, Android </a:t>
-            </a:r>
-            <a:r>
-              <a:rPr lang="en-US" sz="1600" dirty="0" err="1">
-                <a:solidFill>
-                  <a:schemeClr val="tx1"/>
-                </a:solidFill>
-              </a:rPr>
-              <a:t>işletim</a:t>
-            </a:r>
-            <a:r>
-              <a:rPr lang="en-US" sz="1600" dirty="0">
-                <a:solidFill>
-                  <a:schemeClr val="tx1"/>
-                </a:solidFill>
-              </a:rPr>
-              <a:t> </a:t>
-            </a:r>
-            <a:r>
-              <a:rPr lang="en-US" sz="1600" dirty="0" err="1">
-                <a:solidFill>
-                  <a:schemeClr val="tx1"/>
-                </a:solidFill>
-              </a:rPr>
-              <a:t>sistemindeki</a:t>
-            </a:r>
-            <a:r>
-              <a:rPr lang="en-US" sz="1600" dirty="0">
-                <a:solidFill>
-                  <a:schemeClr val="tx1"/>
-                </a:solidFill>
-              </a:rPr>
-              <a:t> </a:t>
-            </a:r>
-            <a:r>
-              <a:rPr lang="en-US" sz="1600" dirty="0" err="1">
-                <a:solidFill>
-                  <a:schemeClr val="tx1"/>
-                </a:solidFill>
-              </a:rPr>
-              <a:t>görsel</a:t>
-            </a:r>
-            <a:r>
-              <a:rPr lang="en-US" sz="1600" dirty="0">
-                <a:solidFill>
-                  <a:schemeClr val="tx1"/>
-                </a:solidFill>
-              </a:rPr>
-              <a:t> </a:t>
-            </a:r>
-            <a:r>
-              <a:rPr lang="en-US" sz="1600" dirty="0" err="1">
-                <a:solidFill>
-                  <a:schemeClr val="tx1"/>
-                </a:solidFill>
-              </a:rPr>
-              <a:t>nesnelerdir</a:t>
-            </a:r>
-            <a:r>
-              <a:rPr lang="en-US" sz="1600" dirty="0">
-                <a:solidFill>
-                  <a:schemeClr val="tx1"/>
-                </a:solidFill>
-              </a:rPr>
-              <a:t>.</a:t>
+              <a:t>, Android işletim sistemindeki görsel nesnelerdir.</a:t>
             </a:r>
             <a:br>
               <a:rPr lang="en-US" sz="1600" dirty="0">
@@ -20455,20 +19936,12 @@
           </a:p>
           <a:p>
             <a:r>
-              <a:rPr lang="en-US" sz="1600" b="1" dirty="0" err="1">
-                <a:solidFill>
-                  <a:schemeClr val="tx1"/>
-                </a:solidFill>
-              </a:rPr>
-              <a:t>onStart</a:t>
-            </a:r>
-            <a:r>
               <a:rPr lang="en-US" sz="1600" b="1" dirty="0">
                 <a:solidFill>
                   <a:schemeClr val="tx1"/>
                 </a:solidFill>
               </a:rPr>
-              <a:t>(): </a:t>
+              <a:t>onStart(): </a:t>
             </a:r>
             <a:r>
               <a:rPr lang="en-US" sz="1600" dirty="0">
@@ -20476,119 +19949,7 @@
                   <a:schemeClr val="tx1"/>
                 </a:solidFill>
               </a:rPr>
-              <a:t>Bu </a:t>
-            </a:r>
-            <a:r>
-              <a:rPr lang="en-US" sz="1600" dirty="0" err="1">
-                <a:solidFill>
-                  <a:schemeClr val="tx1"/>
-                </a:solidFill>
-              </a:rPr>
-              <a:t>metod</a:t>
-            </a:r>
-            <a:r>
-              <a:rPr lang="en-US" sz="1600" dirty="0">
-                <a:solidFill>
-                  <a:schemeClr val="tx1"/>
-                </a:solidFill>
-              </a:rPr>
-              <a:t> </a:t>
-            </a:r>
-            <a:r>
-              <a:rPr lang="en-US" sz="1600" dirty="0" err="1">
-                <a:solidFill>
-                  <a:schemeClr val="tx1"/>
-                </a:solidFill>
-              </a:rPr>
-              <a:t>ile</a:t>
-            </a:r>
-            <a:r>
-              <a:rPr lang="en-US" sz="1600" dirty="0">
-                <a:solidFill>
-                  <a:schemeClr val="tx1"/>
-                </a:solidFill>
-              </a:rPr>
-              <a:t> </a:t>
-            </a:r>
-            <a:r>
-              <a:rPr lang="en-US" sz="1600" dirty="0" err="1">
-                <a:solidFill>
-                  <a:schemeClr val="tx1"/>
-                </a:solidFill>
-              </a:rPr>
-              <a:t>aktivite</a:t>
-            </a:r>
-            <a:r>
-              <a:rPr lang="en-US" sz="1600" dirty="0">
-                <a:solidFill>
-                  <a:schemeClr val="tx1"/>
-                </a:solidFill>
-              </a:rPr>
-              <a:t> </a:t>
-            </a:r>
-            <a:r>
-              <a:rPr lang="en-US" sz="1600" dirty="0" err="1">
-                <a:solidFill>
-                  <a:schemeClr val="tx1"/>
-                </a:solidFill>
-              </a:rPr>
-              <a:t>artık</a:t>
-            </a:r>
-            <a:r>
-              <a:rPr lang="en-US" sz="1600" dirty="0">
-                <a:solidFill>
-                  <a:schemeClr val="tx1"/>
-                </a:solidFill>
-              </a:rPr>
-              <a:t> </a:t>
-            </a:r>
-            <a:r>
-              <a:rPr lang="en-US" sz="1600" dirty="0" err="1">
-                <a:solidFill>
-                  <a:schemeClr val="tx1"/>
-                </a:solidFill>
-              </a:rPr>
-              <a:t>kullanıcı</a:t>
-            </a:r>
-            <a:r>
-              <a:rPr lang="en-US" sz="1600" dirty="0">
-                <a:solidFill>
-                  <a:schemeClr val="tx1"/>
-                </a:solidFill>
-              </a:rPr>
-              <a:t> </a:t>
-            </a:r>
-            <a:r>
-              <a:rPr lang="en-US" sz="1600" dirty="0" err="1">
-                <a:solidFill>
-                  <a:schemeClr val="tx1"/>
-                </a:solidFill>
-              </a:rPr>
-              <a:t>tarafında</a:t>
-            </a:r>
-            <a:r>
-              <a:rPr lang="en-US" sz="1600" dirty="0">
-                <a:solidFill>
-                  <a:schemeClr val="tx1"/>
-                </a:solidFill>
-              </a:rPr>
-              <a:t> </a:t>
-            </a:r>
-            <a:r>
-              <a:rPr lang="en-US" sz="1600" dirty="0" err="1">
-                <a:solidFill>
-                  <a:schemeClr val="tx1"/>
-                </a:solidFill>
-              </a:rPr>
-              <a:t>görünür</a:t>
-            </a:r>
-            <a:r>
-              <a:rPr lang="en-US" sz="1600" dirty="0">
-                <a:solidFill>
-                  <a:schemeClr val="tx1"/>
-                </a:solidFill>
-              </a:rPr>
-              <a:t> (visible)</a:t>
+              <a:t>Bu metod ile aktivite artık kullanıcı tarafında görünür (visible)</a:t>
             </a:r>
             <a:r>
               <a:rPr lang="tr-TR" sz="1600" dirty="0">
@@ -20599,12 +19960,22 @@
               <a:t> </a:t>
             </a:r>
             <a:r>
-              <a:rPr lang="en-US" sz="1600" dirty="0" err="1">
+              <a:rPr lang="en-US" sz="1600" dirty="0">
                 <a:solidFill>
                   <a:schemeClr val="tx1"/>
                 </a:solidFill>
               </a:rPr>
-              <a:t>durumdadır</a:t>
+              <a:t>durumdadır.</a:t>
+            </a:r>
+          </a:p>
+          <a:p>
+            <a:r>
+              <a:rPr lang="en-US" sz="1600" b="1" dirty="0">
+                <a:solidFill>
+                  <a:schemeClr val="tx1"/>
+                </a:solidFill>
+              </a:rPr>
+              <a:t>onResume(): </a:t>
             </a:r>
             <a:r>
               <a:rPr lang="en-US" sz="1600" dirty="0">
@@ -20612,169 +19983,7 @@
                   <a:schemeClr val="tx1"/>
                 </a:solidFill>
               </a:rPr>
-              <a:t>.</a:t>
-            </a:r>
-          </a:p>
-          <a:p>
-            <a:r>
-              <a:rPr lang="en-US" sz="1600" b="1" dirty="0" err="1">
-                <a:solidFill>
-                  <a:schemeClr val="tx1"/>
-                </a:solidFill>
-              </a:rPr>
-              <a:t>onResume</a:t>
-            </a:r>
-            <a:r>
-              <a:rPr lang="en-US" sz="1600" b="1" dirty="0">
-                <a:solidFill>
-                  <a:schemeClr val="tx1"/>
-                </a:solidFill>
-              </a:rPr>
-              <a:t>(): </a:t>
-            </a:r>
-            <a:r>
-              <a:rPr lang="en-US" sz="1600" dirty="0">
-                <a:solidFill>
-                  <a:schemeClr val="tx1"/>
-                </a:solidFill>
-              </a:rPr>
-              <a:t>Bu </a:t>
-            </a:r>
-            <a:r>
-              <a:rPr lang="en-US" sz="1600" dirty="0" err="1">
-                <a:solidFill>
-                  <a:schemeClr val="tx1"/>
-                </a:solidFill>
-              </a:rPr>
-              <a:t>metod</a:t>
-            </a:r>
-            <a:r>
-              <a:rPr lang="en-US" sz="1600" dirty="0">
-                <a:solidFill>
-                  <a:schemeClr val="tx1"/>
-                </a:solidFill>
-              </a:rPr>
-              <a:t> </a:t>
-            </a:r>
-            <a:r>
-              <a:rPr lang="en-US" sz="1600" dirty="0" err="1">
-                <a:solidFill>
-                  <a:schemeClr val="tx1"/>
-                </a:solidFill>
-              </a:rPr>
-              <a:t>ile</a:t>
-            </a:r>
-            <a:r>
-              <a:rPr lang="en-US" sz="1600" dirty="0">
-                <a:solidFill>
-                  <a:schemeClr val="tx1"/>
-                </a:solidFill>
-              </a:rPr>
-              <a:t> </a:t>
-            </a:r>
-            <a:r>
-              <a:rPr lang="en-US" sz="1600" dirty="0" err="1">
-                <a:solidFill>
-                  <a:schemeClr val="tx1"/>
-                </a:solidFill>
-              </a:rPr>
-              <a:t>birlikte</a:t>
-            </a:r>
-            <a:r>
-              <a:rPr lang="en-US" sz="1600" dirty="0">
-                <a:solidFill>
-                  <a:schemeClr val="tx1"/>
-                </a:solidFill>
-              </a:rPr>
-              <a:t> </a:t>
-            </a:r>
-            <a:r>
-              <a:rPr lang="en-US" sz="1600" dirty="0" err="1">
-                <a:solidFill>
-                  <a:schemeClr val="tx1"/>
-                </a:solidFill>
-              </a:rPr>
-              <a:t>kullanıcı</a:t>
-            </a:r>
-            <a:r>
-              <a:rPr lang="en-US" sz="1600" dirty="0">
-                <a:solidFill>
-                  <a:schemeClr val="tx1"/>
-                </a:solidFill>
-              </a:rPr>
-              <a:t> </a:t>
-            </a:r>
-            <a:r>
-              <a:rPr lang="en-US" sz="1600" dirty="0" err="1">
-                <a:solidFill>
-                  <a:schemeClr val="tx1"/>
-                </a:solidFill>
-              </a:rPr>
-              <a:t>artık</a:t>
-            </a:r>
-            <a:r>
-              <a:rPr lang="en-US" sz="1600" dirty="0">
-                <a:solidFill>
-                  <a:schemeClr val="tx1"/>
-                </a:solidFill>
-              </a:rPr>
-              <a:t> </a:t>
-            </a:r>
-            <a:r>
-              <a:rPr lang="en-US" sz="1600" dirty="0" err="1">
-                <a:solidFill>
-                  <a:schemeClr val="tx1"/>
-                </a:solidFill>
-              </a:rPr>
-              <a:t>uygulama</a:t>
-            </a:r>
-            <a:r>
-              <a:rPr lang="en-US" sz="1600" dirty="0">
-                <a:solidFill>
-                  <a:schemeClr val="tx1"/>
-                </a:solidFill>
-              </a:rPr>
-              <a:t> </a:t>
-            </a:r>
-            <a:r>
-              <a:rPr lang="en-US" sz="1600" dirty="0" err="1">
-                <a:solidFill>
-                  <a:schemeClr val="tx1"/>
-                </a:solidFill>
-              </a:rPr>
-              <a:t>ile</a:t>
-            </a:r>
-            <a:r>
-              <a:rPr lang="en-US" sz="1600" dirty="0">
-                <a:solidFill>
-                  <a:schemeClr val="tx1"/>
-                </a:solidFill>
-              </a:rPr>
-              <a:t> </a:t>
-            </a:r>
-            <a:r>
-              <a:rPr lang="en-US" sz="1600" dirty="0" err="1">
-                <a:solidFill>
-                  <a:schemeClr val="tx1"/>
-                </a:solidFill>
-              </a:rPr>
-              <a:t>karşılıklı</a:t>
-            </a:r>
-            <a:r>
-              <a:rPr lang="en-US" sz="1600" dirty="0">
-                <a:solidFill>
-                  <a:schemeClr val="tx1"/>
-                </a:solidFill>
-              </a:rPr>
-              <a:t> </a:t>
-            </a:r>
-            <a:r>
-              <a:rPr lang="en-US" sz="1600" dirty="0" err="1">
-                <a:solidFill>
-                  <a:schemeClr val="tx1"/>
-                </a:solidFill>
-              </a:rPr>
-              <a:t>iletişim</a:t>
+              <a:t>Bu metod ile birlikte kullanıcı artık uygulama ile karşılıklı iletişim</a:t>
             </a:r>
             <a:r>
               <a:rPr lang="tr-TR" sz="1600" dirty="0">
@@ -20785,12 +19994,22 @@
               <a:t> </a:t>
             </a:r>
             <a:r>
-              <a:rPr lang="en-US" sz="1600" dirty="0" err="1">
+              <a:rPr lang="en-US" sz="1600" dirty="0">
                 <a:solidFill>
                   <a:schemeClr val="tx1"/>
                 </a:solidFill>
               </a:rPr>
-              <a:t>halindedir</a:t>
+              <a:t>halindedir.</a:t>
+            </a:r>
+          </a:p>
+          <a:p>
+            <a:r>
+              <a:rPr lang="en-US" sz="1600" b="1" dirty="0">
+                <a:solidFill>
+                  <a:schemeClr val="tx1"/>
+                </a:solidFill>
+              </a:rPr>
+              <a:t>onPause(): </a:t>
             </a:r>
             <a:r>
               <a:rPr lang="en-US" sz="1600" dirty="0">
@@ -20798,161 +20017,7 @@
                   <a:schemeClr val="tx1"/>
                 </a:solidFill>
               </a:rPr>
-              <a:t>.</a:t>
-            </a:r>
-          </a:p>
-          <a:p>
-            <a:r>
-              <a:rPr lang="en-US" sz="1600" b="1" dirty="0" err="1">
-                <a:solidFill>
-                  <a:schemeClr val="tx1"/>
-                </a:solidFill>
-              </a:rPr>
-              <a:t>onPause</a:t>
-            </a:r>
-            <a:r>
-              <a:rPr lang="en-US" sz="1600" b="1" dirty="0">
-                <a:solidFill>
-                  <a:schemeClr val="tx1"/>
-                </a:solidFill>
-              </a:rPr>
-              <a:t>(): </a:t>
-            </a:r>
-            <a:r>
-              <a:rPr lang="en-US" sz="1600" dirty="0" err="1">
-                <a:solidFill>
-                  <a:schemeClr val="tx1"/>
-                </a:solidFill>
-              </a:rPr>
-              <a:t>Bununla</a:t>
-            </a:r>
-            <a:r>
-              <a:rPr lang="en-US" sz="1600" dirty="0">
-                <a:solidFill>
-                  <a:schemeClr val="tx1"/>
-                </a:solidFill>
-              </a:rPr>
-              <a:t> </a:t>
-            </a:r>
-            <a:r>
-              <a:rPr lang="en-US" sz="1600" dirty="0" err="1">
-                <a:solidFill>
-                  <a:schemeClr val="tx1"/>
-                </a:solidFill>
-              </a:rPr>
-              <a:t>beraber</a:t>
-            </a:r>
-            <a:r>
-              <a:rPr lang="en-US" sz="1600" dirty="0">
-                <a:solidFill>
-                  <a:schemeClr val="tx1"/>
-                </a:solidFill>
-              </a:rPr>
-              <a:t> </a:t>
-            </a:r>
-            <a:r>
-              <a:rPr lang="en-US" sz="1600" dirty="0" err="1">
-                <a:solidFill>
-                  <a:schemeClr val="tx1"/>
-                </a:solidFill>
-              </a:rPr>
-              <a:t>artık</a:t>
-            </a:r>
-            <a:r>
-              <a:rPr lang="en-US" sz="1600" dirty="0">
-                <a:solidFill>
-                  <a:schemeClr val="tx1"/>
-                </a:solidFill>
-              </a:rPr>
-              <a:t> </a:t>
-            </a:r>
-            <a:r>
-              <a:rPr lang="en-US" sz="1600" dirty="0" err="1">
-                <a:solidFill>
-                  <a:schemeClr val="tx1"/>
-                </a:solidFill>
-              </a:rPr>
-              <a:t>kullanıcıdan</a:t>
-            </a:r>
-            <a:r>
-              <a:rPr lang="en-US" sz="1600" dirty="0">
-                <a:solidFill>
-                  <a:schemeClr val="tx1"/>
-                </a:solidFill>
-              </a:rPr>
-              <a:t> </a:t>
-            </a:r>
-            <a:r>
-              <a:rPr lang="en-US" sz="1600" dirty="0" err="1">
-                <a:solidFill>
-                  <a:schemeClr val="tx1"/>
-                </a:solidFill>
-              </a:rPr>
-              <a:t>herhangi</a:t>
-            </a:r>
-            <a:r>
-              <a:rPr lang="en-US" sz="1600" dirty="0">
-                <a:solidFill>
-                  <a:schemeClr val="tx1"/>
-                </a:solidFill>
-              </a:rPr>
-              <a:t> </a:t>
-            </a:r>
-            <a:r>
-              <a:rPr lang="en-US" sz="1600" dirty="0" err="1">
-                <a:solidFill>
-                  <a:schemeClr val="tx1"/>
-                </a:solidFill>
-              </a:rPr>
-              <a:t>bir</a:t>
-            </a:r>
-            <a:r>
-              <a:rPr lang="en-US" sz="1600" dirty="0">
-                <a:solidFill>
-                  <a:schemeClr val="tx1"/>
-                </a:solidFill>
-              </a:rPr>
-              <a:t> </a:t>
-            </a:r>
-            <a:r>
-              <a:rPr lang="en-US" sz="1600" dirty="0" err="1">
-                <a:solidFill>
-                  <a:schemeClr val="tx1"/>
-                </a:solidFill>
-              </a:rPr>
-              <a:t>girdi</a:t>
-            </a:r>
-            <a:r>
-              <a:rPr lang="en-US" sz="1600" dirty="0">
-                <a:solidFill>
-                  <a:schemeClr val="tx1"/>
-                </a:solidFill>
-              </a:rPr>
-              <a:t> </a:t>
-            </a:r>
-            <a:r>
-              <a:rPr lang="en-US" sz="1600" dirty="0" err="1">
-                <a:solidFill>
-                  <a:schemeClr val="tx1"/>
-                </a:solidFill>
-              </a:rPr>
-              <a:t>alamaz</a:t>
-            </a:r>
-            <a:r>
-              <a:rPr lang="en-US" sz="1600" dirty="0">
-                <a:solidFill>
-                  <a:schemeClr val="tx1"/>
-                </a:solidFill>
-              </a:rPr>
-              <a:t> </a:t>
-            </a:r>
-            <a:r>
-              <a:rPr lang="en-US" sz="1600" dirty="0" err="1">
-                <a:solidFill>
-                  <a:schemeClr val="tx1"/>
-                </a:solidFill>
-              </a:rPr>
-              <a:t>ve</a:t>
+              <a:t>Bununla beraber artık kullanıcıdan herhangi bir girdi alamaz ve</a:t>
             </a:r>
             <a:r>
               <a:rPr lang="tr-TR" sz="1600" dirty="0">
@@ -20963,12 +20028,22 @@
               <a:t> </a:t>
             </a:r>
             <a:r>
-              <a:rPr lang="en-US" sz="1600" dirty="0" err="1">
+              <a:rPr lang="en-US" sz="1600" dirty="0">
                 <a:solidFill>
                   <a:schemeClr val="tx1"/>
                 </a:solidFill>
               </a:rPr>
-              <a:t>hiçbir</a:t>
+              <a:t>hiçbir kod çalıştırılamaz.</a:t>
+            </a:r>
+          </a:p>
+          <a:p>
+            <a:r>
+              <a:rPr lang="en-US" sz="1600" b="1" dirty="0">
+                <a:solidFill>
+                  <a:schemeClr val="tx1"/>
+                </a:solidFill>
+              </a:rPr>
+              <a:t>onStop(): </a:t>
             </a:r>
             <a:r>
               <a:rPr lang="en-US" sz="1600" dirty="0">
@@ -20976,15 +20051,17 @@
                   <a:schemeClr val="tx1"/>
                 </a:solidFill>
               </a:rPr>
-              <a:t> </a:t>
+              <a:t>Artık aktivite görünür (visible) durumda değildir.</a:t>
             </a:r>
+          </a:p>
+          <a:p>
             <a:r>
-              <a:rPr lang="en-US" sz="1600" dirty="0" err="1">
+              <a:rPr lang="en-US" sz="1600" b="1" dirty="0">
                 <a:solidFill>
                   <a:schemeClr val="tx1"/>
                 </a:solidFill>
               </a:rPr>
-              <a:t>kod</a:t>
+              <a:t>onDestroy(): </a:t>
             </a:r>
             <a:r>
               <a:rPr lang="en-US" sz="1600" dirty="0">
@@ -20992,15 +20069,17 @@
                   <a:schemeClr val="tx1"/>
                 </a:solidFill>
               </a:rPr>
-              <a:t> </a:t>
+              <a:t>Aktivite sistem tarafından yok edilmeden önce bu metod çağırılır.</a:t>
             </a:r>
+          </a:p>
+          <a:p>
             <a:r>
-              <a:rPr lang="en-US" sz="1600" dirty="0" err="1">
+              <a:rPr lang="en-US" sz="1600" b="1" dirty="0">
                 <a:solidFill>
                   <a:schemeClr val="tx1"/>
                 </a:solidFill>
               </a:rPr>
-              <a:t>çalıştırılamaz</a:t>
+              <a:t>onRestart(): </a:t>
             </a:r>
             <a:r>
               <a:rPr lang="en-US" sz="1600" dirty="0">
@@ -21008,389 +20087,7 @@
                   <a:schemeClr val="tx1"/>
                 </a:solidFill>
               </a:rPr>
-              <a:t>.</a:t>
-            </a:r>
-          </a:p>
-          <a:p>
-            <a:r>
-              <a:rPr lang="en-US" sz="1600" b="1" dirty="0" err="1">
-                <a:solidFill>
-                  <a:schemeClr val="tx1"/>
-                </a:solidFill>
-              </a:rPr>
-              <a:t>onStop</a:t>
-            </a:r>
-            <a:r>
-              <a:rPr lang="en-US" sz="1600" b="1" dirty="0">
-                <a:solidFill>
-                  <a:schemeClr val="tx1"/>
-                </a:solidFill>
-              </a:rPr>
-              <a:t>(): </a:t>
-            </a:r>
-            <a:r>
-              <a:rPr lang="en-US" sz="1600" dirty="0" err="1">
-                <a:solidFill>
-                  <a:schemeClr val="tx1"/>
-                </a:solidFill>
-              </a:rPr>
-              <a:t>Artık</a:t>
-            </a:r>
-            <a:r>
-              <a:rPr lang="en-US" sz="1600" dirty="0">
-                <a:solidFill>
-                  <a:schemeClr val="tx1"/>
-                </a:solidFill>
-              </a:rPr>
-              <a:t> </a:t>
-            </a:r>
-            <a:r>
-              <a:rPr lang="en-US" sz="1600" dirty="0" err="1">
-                <a:solidFill>
-                  <a:schemeClr val="tx1"/>
-                </a:solidFill>
-              </a:rPr>
-              <a:t>aktivite</a:t>
-            </a:r>
-            <a:r>
-              <a:rPr lang="en-US" sz="1600" dirty="0">
-                <a:solidFill>
-                  <a:schemeClr val="tx1"/>
-                </a:solidFill>
-              </a:rPr>
-              <a:t> </a:t>
-            </a:r>
-            <a:r>
-              <a:rPr lang="en-US" sz="1600" dirty="0" err="1">
-                <a:solidFill>
-                  <a:schemeClr val="tx1"/>
-                </a:solidFill>
-              </a:rPr>
-              <a:t>görünür</a:t>
-            </a:r>
-            <a:r>
-              <a:rPr lang="en-US" sz="1600" dirty="0">
-                <a:solidFill>
-                  <a:schemeClr val="tx1"/>
-                </a:solidFill>
-              </a:rPr>
-              <a:t> (visible) </a:t>
-            </a:r>
-            <a:r>
-              <a:rPr lang="en-US" sz="1600" dirty="0" err="1">
-                <a:solidFill>
-                  <a:schemeClr val="tx1"/>
-                </a:solidFill>
-              </a:rPr>
-              <a:t>durumda</a:t>
-            </a:r>
-            <a:r>
-              <a:rPr lang="en-US" sz="1600" dirty="0">
-                <a:solidFill>
-                  <a:schemeClr val="tx1"/>
-                </a:solidFill>
-              </a:rPr>
-              <a:t> </a:t>
-            </a:r>
-            <a:r>
-              <a:rPr lang="en-US" sz="1600" dirty="0" err="1">
-                <a:solidFill>
-                  <a:schemeClr val="tx1"/>
-                </a:solidFill>
-              </a:rPr>
-              <a:t>değildir</a:t>
-            </a:r>
-            <a:r>
-              <a:rPr lang="en-US" sz="1600" dirty="0">
-                <a:solidFill>
-                  <a:schemeClr val="tx1"/>
-                </a:solidFill>
-              </a:rPr>
-              <a:t>.</a:t>
-            </a:r>
-          </a:p>
-          <a:p>
-            <a:r>
-              <a:rPr lang="en-US" sz="1600" b="1" dirty="0" err="1">
-                <a:solidFill>
-                  <a:schemeClr val="tx1"/>
-                </a:solidFill>
-              </a:rPr>
-              <a:t>onDestroy</a:t>
-            </a:r>
-            <a:r>
-              <a:rPr lang="en-US" sz="1600" b="1" dirty="0">
-                <a:solidFill>
-                  <a:schemeClr val="tx1"/>
-                </a:solidFill>
-              </a:rPr>
-              <a:t>(): </a:t>
-            </a:r>
-            <a:r>
-              <a:rPr lang="en-US" sz="1600" dirty="0" err="1">
-                <a:solidFill>
-                  <a:schemeClr val="tx1"/>
-                </a:solidFill>
-              </a:rPr>
-              <a:t>Aktivite</a:t>
-            </a:r>
-            <a:r>
-              <a:rPr lang="en-US" sz="1600" dirty="0">
-                <a:solidFill>
-                  <a:schemeClr val="tx1"/>
-                </a:solidFill>
-              </a:rPr>
-              <a:t> </a:t>
-            </a:r>
-            <a:r>
-              <a:rPr lang="en-US" sz="1600" dirty="0" err="1">
-                <a:solidFill>
-                  <a:schemeClr val="tx1"/>
-                </a:solidFill>
-              </a:rPr>
-              <a:t>sistem</a:t>
-            </a:r>
-            <a:r>
-              <a:rPr lang="en-US" sz="1600" dirty="0">
-                <a:solidFill>
-                  <a:schemeClr val="tx1"/>
-                </a:solidFill>
-              </a:rPr>
-              <a:t> </a:t>
-            </a:r>
-            <a:r>
-              <a:rPr lang="en-US" sz="1600" dirty="0" err="1">
-                <a:solidFill>
-                  <a:schemeClr val="tx1"/>
-                </a:solidFill>
-              </a:rPr>
-              <a:t>tarafından</a:t>
-            </a:r>
-            <a:r>
-              <a:rPr lang="en-US" sz="1600" dirty="0">
-                <a:solidFill>
-                  <a:schemeClr val="tx1"/>
-                </a:solidFill>
-              </a:rPr>
-              <a:t> yok </a:t>
-            </a:r>
-            <a:r>
-              <a:rPr lang="en-US" sz="1600" dirty="0" err="1">
-                <a:solidFill>
-                  <a:schemeClr val="tx1"/>
-                </a:solidFill>
-              </a:rPr>
-              <a:t>edilmeden</a:t>
-            </a:r>
-            <a:r>
-              <a:rPr lang="en-US" sz="1600" dirty="0">
-                <a:solidFill>
-                  <a:schemeClr val="tx1"/>
-                </a:solidFill>
-              </a:rPr>
-              <a:t> </a:t>
-            </a:r>
-            <a:r>
-              <a:rPr lang="en-US" sz="1600" dirty="0" err="1">
-                <a:solidFill>
-                  <a:schemeClr val="tx1"/>
-                </a:solidFill>
-              </a:rPr>
-              <a:t>önce</a:t>
-            </a:r>
-            <a:r>
-              <a:rPr lang="en-US" sz="1600" dirty="0">
-                <a:solidFill>
-                  <a:schemeClr val="tx1"/>
-                </a:solidFill>
-              </a:rPr>
-              <a:t> </a:t>
-            </a:r>
-            <a:r>
-              <a:rPr lang="en-US" sz="1600" dirty="0" err="1">
-                <a:solidFill>
-                  <a:schemeClr val="tx1"/>
-                </a:solidFill>
-              </a:rPr>
-              <a:t>bu</a:t>
-            </a:r>
-            <a:r>
-              <a:rPr lang="en-US" sz="1600" dirty="0">
-                <a:solidFill>
-                  <a:schemeClr val="tx1"/>
-                </a:solidFill>
-              </a:rPr>
-              <a:t> </a:t>
-            </a:r>
-            <a:r>
-              <a:rPr lang="en-US" sz="1600" dirty="0" err="1">
-                <a:solidFill>
-                  <a:schemeClr val="tx1"/>
-                </a:solidFill>
-              </a:rPr>
-              <a:t>metod</a:t>
-            </a:r>
-            <a:r>
-              <a:rPr lang="en-US" sz="1600" dirty="0">
-                <a:solidFill>
-                  <a:schemeClr val="tx1"/>
-                </a:solidFill>
-              </a:rPr>
-              <a:t> </a:t>
-            </a:r>
-            <a:r>
-              <a:rPr lang="en-US" sz="1600" dirty="0" err="1">
-                <a:solidFill>
-                  <a:schemeClr val="tx1"/>
-                </a:solidFill>
-              </a:rPr>
-              <a:t>çağırılır</a:t>
-            </a:r>
-            <a:r>
-              <a:rPr lang="en-US" sz="1600" dirty="0">
-                <a:solidFill>
-                  <a:schemeClr val="tx1"/>
-                </a:solidFill>
-              </a:rPr>
-              <a:t>.</a:t>
-            </a:r>
-          </a:p>
-          <a:p>
-            <a:r>
-              <a:rPr lang="en-US" sz="1600" b="1" dirty="0" err="1">
-                <a:solidFill>
-                  <a:schemeClr val="tx1"/>
-                </a:solidFill>
-              </a:rPr>
-              <a:t>onRestart</a:t>
-            </a:r>
-            <a:r>
-              <a:rPr lang="en-US" sz="1600" b="1" dirty="0">
-                <a:solidFill>
-                  <a:schemeClr val="tx1"/>
-                </a:solidFill>
-              </a:rPr>
-              <a:t>(): </a:t>
-            </a:r>
-            <a:r>
-              <a:rPr lang="en-US" sz="1600" dirty="0" err="1">
-                <a:solidFill>
-                  <a:schemeClr val="tx1"/>
-                </a:solidFill>
-              </a:rPr>
-              <a:t>Aktivite</a:t>
-            </a:r>
-            <a:r>
-              <a:rPr lang="en-US" sz="1600" dirty="0">
-                <a:solidFill>
-                  <a:schemeClr val="tx1"/>
-                </a:solidFill>
-              </a:rPr>
-              <a:t> </a:t>
-            </a:r>
-            <a:r>
-              <a:rPr lang="en-US" sz="1600" dirty="0" err="1">
-                <a:solidFill>
-                  <a:schemeClr val="tx1"/>
-                </a:solidFill>
-              </a:rPr>
-              <a:t>durdurulduktan</a:t>
-            </a:r>
-            <a:r>
-              <a:rPr lang="en-US" sz="1600" dirty="0">
-                <a:solidFill>
-                  <a:schemeClr val="tx1"/>
-                </a:solidFill>
-              </a:rPr>
-              <a:t> </a:t>
-            </a:r>
-            <a:r>
-              <a:rPr lang="en-US" sz="1600" dirty="0" err="1">
-                <a:solidFill>
-                  <a:schemeClr val="tx1"/>
-                </a:solidFill>
-              </a:rPr>
-              <a:t>sonra</a:t>
-            </a:r>
-            <a:r>
-              <a:rPr lang="en-US" sz="1600" dirty="0">
-                <a:solidFill>
-                  <a:schemeClr val="tx1"/>
-                </a:solidFill>
-              </a:rPr>
-              <a:t> </a:t>
-            </a:r>
-            <a:r>
-              <a:rPr lang="en-US" sz="1600" dirty="0" err="1">
-                <a:solidFill>
-                  <a:schemeClr val="tx1"/>
-                </a:solidFill>
-              </a:rPr>
-              <a:t>tekrar</a:t>
-            </a:r>
-            <a:r>
-              <a:rPr lang="en-US" sz="1600" dirty="0">
-                <a:solidFill>
-                  <a:schemeClr val="tx1"/>
-                </a:solidFill>
-              </a:rPr>
-              <a:t> </a:t>
-            </a:r>
-            <a:r>
-              <a:rPr lang="en-US" sz="1600" dirty="0" err="1">
-                <a:solidFill>
-                  <a:schemeClr val="tx1"/>
-                </a:solidFill>
-              </a:rPr>
-              <a:t>başlatılmak</a:t>
-            </a:r>
-            <a:r>
-              <a:rPr lang="en-US" sz="1600" dirty="0">
-                <a:solidFill>
-                  <a:schemeClr val="tx1"/>
-                </a:solidFill>
-              </a:rPr>
-              <a:t> </a:t>
-            </a:r>
-            <a:r>
-              <a:rPr lang="en-US" sz="1600" dirty="0" err="1">
-                <a:solidFill>
-                  <a:schemeClr val="tx1"/>
-                </a:solidFill>
-              </a:rPr>
-              <a:t>için</a:t>
-            </a:r>
-            <a:r>
-              <a:rPr lang="en-US" sz="1600" dirty="0">
-                <a:solidFill>
-                  <a:schemeClr val="tx1"/>
-                </a:solidFill>
-              </a:rPr>
-              <a:t> </a:t>
-            </a:r>
-            <a:r>
-              <a:rPr lang="en-US" sz="1600" dirty="0" err="1">
-                <a:solidFill>
-                  <a:schemeClr val="tx1"/>
-                </a:solidFill>
-              </a:rPr>
-              <a:t>bu</a:t>
-            </a:r>
-            <a:r>
-              <a:rPr lang="en-US" sz="1600" dirty="0">
-                <a:solidFill>
-                  <a:schemeClr val="tx1"/>
-                </a:solidFill>
-              </a:rPr>
-              <a:t> </a:t>
-            </a:r>
-            <a:r>
-              <a:rPr lang="en-US" sz="1600" dirty="0" err="1">
-                <a:solidFill>
-                  <a:schemeClr val="tx1"/>
-                </a:solidFill>
-              </a:rPr>
-              <a:t>metod</a:t>
+              <a:t>Aktivite durdurulduktan sonra tekrar başlatılmak için bu metod</a:t>
             </a:r>
             <a:r>
               <a:rPr lang="tr-TR" sz="1600" dirty="0">
@@ -21401,20 +20098,12 @@
               <a:t> </a:t>
             </a:r>
             <a:r>
-              <a:rPr lang="en-US" sz="1600" dirty="0" err="1">
-                <a:solidFill>
-                  <a:schemeClr val="tx1"/>
-                </a:solidFill>
-              </a:rPr>
-              <a:t>kullanılır</a:t>
-            </a:r>
-            <a:r>
               <a:rPr lang="en-US" sz="1600" dirty="0">
                 <a:solidFill>
                   <a:schemeClr val="tx1"/>
                 </a:solidFill>
               </a:rPr>
-              <a:t>.</a:t>
+              <a:t>kullanılır.</a:t>
             </a:r>
           </a:p>
         </p:txBody>
@@ -21747,7 +20436,7 @@
           <a:lstStyle/>
           <a:p>
             <a:pPr algn="ctr"/>
-            <a:endParaRPr lang="en-US"/>
+            <a:endParaRPr lang="en-US" dirty="0"/>
           </a:p>
         </p:txBody>
       </p:sp>
@@ -21871,7 +20560,7 @@
             <p:ph idx="1"/>
             <p:extLst>
               <p:ext uri="{D42A27DB-BD31-4B8C-83A1-F6EECF244321}">
-                <p14:modId xmlns:p14="http://schemas.microsoft.com/office/powerpoint/2010/main" val="2076818113"/>
+                <p14:modId xmlns:p14="http://schemas.microsoft.com/office/powerpoint/2010/main" val="3991293342"/>
               </p:ext>
             </p:extLst>
           </p:nvPr>
@@ -21986,7 +20675,7 @@
         </p:blipFill>
         <p:spPr>
           <a:xfrm>
-            <a:off x="5735232" y="2192692"/>
+            <a:off x="5710294" y="2192692"/>
             <a:ext cx="590460" cy="590460"/>
           </a:xfrm>
           <a:prstGeom prst="rect">
@@ -22314,199 +21003,7 @@
                   <a:schemeClr val="tx1"/>
                 </a:solidFill>
               </a:rPr>
-              <a:t>Activity </a:t>
-            </a:r>
-            <a:r>
-              <a:rPr lang="en-US" sz="1600" dirty="0" err="1">
-                <a:solidFill>
-                  <a:schemeClr val="tx1"/>
-                </a:solidFill>
-              </a:rPr>
-              <a:t>ve</a:t>
-            </a:r>
-            <a:r>
-              <a:rPr lang="en-US" sz="1600" dirty="0">
-                <a:solidFill>
-                  <a:schemeClr val="tx1"/>
-                </a:solidFill>
-              </a:rPr>
-              <a:t> </a:t>
-            </a:r>
-            <a:r>
-              <a:rPr lang="en-US" sz="1600" dirty="0" err="1">
-                <a:solidFill>
-                  <a:schemeClr val="tx1"/>
-                </a:solidFill>
-              </a:rPr>
-              <a:t>fragmentlar</a:t>
-            </a:r>
-            <a:r>
-              <a:rPr lang="en-US" sz="1600" dirty="0">
-                <a:solidFill>
-                  <a:schemeClr val="tx1"/>
-                </a:solidFill>
-              </a:rPr>
-              <a:t> </a:t>
-            </a:r>
-            <a:r>
-              <a:rPr lang="en-US" sz="1600" dirty="0" err="1">
-                <a:solidFill>
-                  <a:schemeClr val="tx1"/>
-                </a:solidFill>
-              </a:rPr>
-              <a:t>uygulamanın</a:t>
-            </a:r>
-            <a:r>
-              <a:rPr lang="en-US" sz="1600" dirty="0">
-                <a:solidFill>
-                  <a:schemeClr val="tx1"/>
-                </a:solidFill>
-              </a:rPr>
-              <a:t> </a:t>
-            </a:r>
-            <a:r>
-              <a:rPr lang="en-US" sz="1600" dirty="0" err="1">
-                <a:solidFill>
-                  <a:schemeClr val="tx1"/>
-                </a:solidFill>
-              </a:rPr>
-              <a:t>ekranına</a:t>
-            </a:r>
-            <a:r>
-              <a:rPr lang="en-US" sz="1600" dirty="0">
-                <a:solidFill>
-                  <a:schemeClr val="tx1"/>
-                </a:solidFill>
-              </a:rPr>
-              <a:t> </a:t>
-            </a:r>
-            <a:r>
-              <a:rPr lang="en-US" sz="1600" dirty="0" err="1">
-                <a:solidFill>
-                  <a:schemeClr val="tx1"/>
-                </a:solidFill>
-              </a:rPr>
-              <a:t>baktığımızda</a:t>
-            </a:r>
-            <a:r>
-              <a:rPr lang="en-US" sz="1600" dirty="0">
-                <a:solidFill>
-                  <a:schemeClr val="tx1"/>
-                </a:solidFill>
-              </a:rPr>
-              <a:t> </a:t>
-            </a:r>
-            <a:r>
-              <a:rPr lang="en-US" sz="1600" dirty="0" err="1">
-                <a:solidFill>
-                  <a:schemeClr val="tx1"/>
-                </a:solidFill>
-              </a:rPr>
-              <a:t>orda</a:t>
-            </a:r>
-            <a:r>
-              <a:rPr lang="en-US" sz="1600" dirty="0">
-                <a:solidFill>
-                  <a:schemeClr val="tx1"/>
-                </a:solidFill>
-              </a:rPr>
-              <a:t> </a:t>
-            </a:r>
-            <a:r>
-              <a:rPr lang="en-US" sz="1600" dirty="0" err="1">
-                <a:solidFill>
-                  <a:schemeClr val="tx1"/>
-                </a:solidFill>
-              </a:rPr>
-              <a:t>tasarımı</a:t>
-            </a:r>
-            <a:r>
-              <a:rPr lang="en-US" sz="1600" dirty="0">
-                <a:solidFill>
-                  <a:schemeClr val="tx1"/>
-                </a:solidFill>
-              </a:rPr>
-              <a:t> </a:t>
-            </a:r>
-            <a:r>
-              <a:rPr lang="en-US" sz="1600" dirty="0" err="1">
-                <a:solidFill>
-                  <a:schemeClr val="tx1"/>
-                </a:solidFill>
-              </a:rPr>
-              <a:t>gösteriyor</a:t>
-            </a:r>
-            <a:r>
-              <a:rPr lang="en-US" sz="1600" dirty="0">
-                <a:solidFill>
-                  <a:schemeClr val="tx1"/>
-                </a:solidFill>
-              </a:rPr>
-              <a:t> </a:t>
-            </a:r>
-            <a:r>
-              <a:rPr lang="en-US" sz="1600" dirty="0" err="1">
-                <a:solidFill>
-                  <a:schemeClr val="tx1"/>
-                </a:solidFill>
-              </a:rPr>
-              <a:t>ve</a:t>
-            </a:r>
-            <a:r>
-              <a:rPr lang="en-US" sz="1600" dirty="0">
-                <a:solidFill>
-                  <a:schemeClr val="tx1"/>
-                </a:solidFill>
-              </a:rPr>
-              <a:t> </a:t>
-            </a:r>
-            <a:r>
-              <a:rPr lang="en-US" sz="1600" dirty="0" err="1">
-                <a:solidFill>
-                  <a:schemeClr val="tx1"/>
-                </a:solidFill>
-              </a:rPr>
-              <a:t>tasarımı</a:t>
-            </a:r>
-            <a:r>
-              <a:rPr lang="en-US" sz="1600" dirty="0">
-                <a:solidFill>
-                  <a:schemeClr val="tx1"/>
-                </a:solidFill>
-              </a:rPr>
-              <a:t> </a:t>
-            </a:r>
-            <a:r>
-              <a:rPr lang="en-US" sz="1600" dirty="0" err="1">
-                <a:solidFill>
-                  <a:schemeClr val="tx1"/>
-                </a:solidFill>
-              </a:rPr>
-              <a:t>yönetmemizi</a:t>
-            </a:r>
-            <a:r>
-              <a:rPr lang="en-US" sz="1600" dirty="0">
-                <a:solidFill>
-                  <a:schemeClr val="tx1"/>
-                </a:solidFill>
-              </a:rPr>
-              <a:t> </a:t>
-            </a:r>
-            <a:r>
-              <a:rPr lang="en-US" sz="1600" dirty="0" err="1">
-                <a:solidFill>
-                  <a:schemeClr val="tx1"/>
-                </a:solidFill>
-              </a:rPr>
-              <a:t>sağlıyor</a:t>
-            </a:r>
-            <a:r>
-              <a:rPr lang="en-US" sz="1600" dirty="0">
-                <a:solidFill>
-                  <a:schemeClr val="tx1"/>
-                </a:solidFill>
-              </a:rPr>
-              <a:t>.</a:t>
+              <a:t>Activity ve fragmentlar uygulamanın ekranına baktığımızda orda tasarımı gösteriyor ve tasarımı yönetmemizi sağlıyor.</a:t>
             </a:r>
             <a:endParaRPr lang="tr-TR" sz="1600" dirty="0">
               <a:solidFill>
@@ -22532,148 +21029,12 @@
               <a:t>a</a:t>
             </a:r>
             <a:r>
-              <a:rPr lang="en-US" sz="1600" dirty="0" err="1">
-                <a:solidFill>
-                  <a:schemeClr val="tx1"/>
-                </a:solidFill>
-              </a:rPr>
-              <a:t>ynı</a:t>
-            </a:r>
-            <a:r>
               <a:rPr lang="en-US" sz="1600" dirty="0">
                 <a:solidFill>
                   <a:schemeClr val="tx1"/>
                 </a:solidFill>
               </a:rPr>
-              <a:t> </a:t>
-            </a:r>
-            <a:r>
-              <a:rPr lang="en-US" sz="1600" dirty="0" err="1">
-                <a:solidFill>
-                  <a:schemeClr val="tx1"/>
-                </a:solidFill>
-              </a:rPr>
-              <a:t>sayfa</a:t>
-            </a:r>
-            <a:r>
-              <a:rPr lang="en-US" sz="1600" dirty="0">
-                <a:solidFill>
-                  <a:schemeClr val="tx1"/>
-                </a:solidFill>
-              </a:rPr>
-              <a:t> </a:t>
-            </a:r>
-            <a:r>
-              <a:rPr lang="en-US" sz="1600" dirty="0" err="1">
-                <a:solidFill>
-                  <a:schemeClr val="tx1"/>
-                </a:solidFill>
-              </a:rPr>
-              <a:t>içerisinde</a:t>
-            </a:r>
-            <a:r>
-              <a:rPr lang="en-US" sz="1600" dirty="0">
-                <a:solidFill>
-                  <a:schemeClr val="tx1"/>
-                </a:solidFill>
-              </a:rPr>
-              <a:t> </a:t>
-            </a:r>
-            <a:r>
-              <a:rPr lang="en-US" sz="1600" dirty="0" err="1">
-                <a:solidFill>
-                  <a:schemeClr val="tx1"/>
-                </a:solidFill>
-              </a:rPr>
-              <a:t>birden</a:t>
-            </a:r>
-            <a:r>
-              <a:rPr lang="en-US" sz="1600" dirty="0">
-                <a:solidFill>
-                  <a:schemeClr val="tx1"/>
-                </a:solidFill>
-              </a:rPr>
-              <a:t> </a:t>
-            </a:r>
-            <a:r>
-              <a:rPr lang="en-US" sz="1600" dirty="0" err="1">
-                <a:solidFill>
-                  <a:schemeClr val="tx1"/>
-                </a:solidFill>
-              </a:rPr>
-              <a:t>fazla</a:t>
-            </a:r>
-            <a:r>
-              <a:rPr lang="en-US" sz="1600" dirty="0">
-                <a:solidFill>
-                  <a:schemeClr val="tx1"/>
-                </a:solidFill>
-              </a:rPr>
-              <a:t> </a:t>
-            </a:r>
-            <a:r>
-              <a:rPr lang="en-US" sz="1600" dirty="0" err="1">
-                <a:solidFill>
-                  <a:schemeClr val="tx1"/>
-                </a:solidFill>
-              </a:rPr>
-              <a:t>sayfa</a:t>
-            </a:r>
-            <a:r>
-              <a:rPr lang="en-US" sz="1600" dirty="0">
-                <a:solidFill>
-                  <a:schemeClr val="tx1"/>
-                </a:solidFill>
-              </a:rPr>
-              <a:t> </a:t>
-            </a:r>
-            <a:r>
-              <a:rPr lang="en-US" sz="1600" dirty="0" err="1">
-                <a:solidFill>
-                  <a:schemeClr val="tx1"/>
-                </a:solidFill>
-              </a:rPr>
-              <a:t>gösterme</a:t>
-            </a:r>
-            <a:r>
-              <a:rPr lang="en-US" sz="1600" dirty="0">
-                <a:solidFill>
-                  <a:schemeClr val="tx1"/>
-                </a:solidFill>
-              </a:rPr>
-              <a:t> </a:t>
-            </a:r>
-            <a:r>
-              <a:rPr lang="en-US" sz="1600" dirty="0" err="1">
-                <a:solidFill>
-                  <a:schemeClr val="tx1"/>
-                </a:solidFill>
-              </a:rPr>
-              <a:t>ihtiyacından</a:t>
-            </a:r>
-            <a:r>
-              <a:rPr lang="en-US" sz="1600" dirty="0">
-                <a:solidFill>
-                  <a:schemeClr val="tx1"/>
-                </a:solidFill>
-              </a:rPr>
-              <a:t> </a:t>
-            </a:r>
-            <a:r>
-              <a:rPr lang="en-US" sz="1600" dirty="0" err="1">
-                <a:solidFill>
-                  <a:schemeClr val="tx1"/>
-                </a:solidFill>
-              </a:rPr>
-              <a:t>doğdu</a:t>
-            </a:r>
-            <a:r>
-              <a:rPr lang="en-US" sz="1600" dirty="0">
-                <a:solidFill>
-                  <a:schemeClr val="tx1"/>
-                </a:solidFill>
-              </a:rPr>
-              <a:t>.</a:t>
+              <a:t>ynı sayfa içerisinde birden fazla sayfa gösterme ihtiyacından doğdu.</a:t>
             </a:r>
             <a:endParaRPr lang="tr-TR" sz="1600" dirty="0">
               <a:solidFill>
@@ -22683,92 +21044,12 @@
           </a:p>
           <a:p>
             <a:r>
-              <a:rPr lang="en-US" sz="1600" dirty="0" err="1">
-                <a:solidFill>
-                  <a:schemeClr val="tx1"/>
-                </a:solidFill>
-              </a:rPr>
-              <a:t>Temelde</a:t>
-            </a:r>
-            <a:r>
               <a:rPr lang="en-US" sz="1600" dirty="0">
                 <a:solidFill>
                   <a:schemeClr val="tx1"/>
                 </a:solidFill>
               </a:rPr>
-              <a:t> </a:t>
-            </a:r>
-            <a:r>
-              <a:rPr lang="en-US" sz="1600" dirty="0" err="1">
-                <a:solidFill>
-                  <a:schemeClr val="tx1"/>
-                </a:solidFill>
-              </a:rPr>
-              <a:t>bir</a:t>
-            </a:r>
-            <a:r>
-              <a:rPr lang="en-US" sz="1600" dirty="0">
-                <a:solidFill>
-                  <a:schemeClr val="tx1"/>
-                </a:solidFill>
-              </a:rPr>
-              <a:t> activity var </a:t>
-            </a:r>
-            <a:r>
-              <a:rPr lang="en-US" sz="1600" dirty="0" err="1">
-                <a:solidFill>
-                  <a:schemeClr val="tx1"/>
-                </a:solidFill>
-              </a:rPr>
-              <a:t>onun</a:t>
-            </a:r>
-            <a:r>
-              <a:rPr lang="en-US" sz="1600" dirty="0">
-                <a:solidFill>
-                  <a:schemeClr val="tx1"/>
-                </a:solidFill>
-              </a:rPr>
-              <a:t> </a:t>
-            </a:r>
-            <a:r>
-              <a:rPr lang="en-US" sz="1600" dirty="0" err="1">
-                <a:solidFill>
-                  <a:schemeClr val="tx1"/>
-                </a:solidFill>
-              </a:rPr>
-              <a:t>üzerine</a:t>
-            </a:r>
-            <a:r>
-              <a:rPr lang="en-US" sz="1600" dirty="0">
-                <a:solidFill>
-                  <a:schemeClr val="tx1"/>
-                </a:solidFill>
-              </a:rPr>
-              <a:t> de </a:t>
-            </a:r>
-            <a:r>
-              <a:rPr lang="en-US" sz="1600" dirty="0" err="1">
-                <a:solidFill>
-                  <a:schemeClr val="tx1"/>
-                </a:solidFill>
-              </a:rPr>
-              <a:t>fragmentlar</a:t>
-            </a:r>
-            <a:r>
-              <a:rPr lang="en-US" sz="1600" dirty="0">
-                <a:solidFill>
-                  <a:schemeClr val="tx1"/>
-                </a:solidFill>
-              </a:rPr>
-              <a:t> </a:t>
-            </a:r>
-            <a:r>
-              <a:rPr lang="en-US" sz="1600" dirty="0" err="1">
-                <a:solidFill>
-                  <a:schemeClr val="tx1"/>
-                </a:solidFill>
-              </a:rPr>
-              <a:t>geliyor</a:t>
+              <a:t>Temelde bir activity var onun üzerine de fragmentlar geliyor</a:t>
             </a:r>
             <a:r>
               <a:rPr lang="tr-TR" sz="1600" dirty="0">
@@ -22794,103 +21075,7 @@
                   <a:schemeClr val="tx1"/>
                 </a:solidFill>
               </a:rPr>
-              <a:t> activity </a:t>
-            </a:r>
-            <a:r>
-              <a:rPr lang="en-US" sz="1600" dirty="0" err="1">
-                <a:solidFill>
-                  <a:schemeClr val="tx1"/>
-                </a:solidFill>
-              </a:rPr>
-              <a:t>özelliklerine</a:t>
-            </a:r>
-            <a:r>
-              <a:rPr lang="en-US" sz="1600" dirty="0">
-                <a:solidFill>
-                  <a:schemeClr val="tx1"/>
-                </a:solidFill>
-              </a:rPr>
-              <a:t> </a:t>
-            </a:r>
-            <a:r>
-              <a:rPr lang="en-US" sz="1600" dirty="0" err="1">
-                <a:solidFill>
-                  <a:schemeClr val="tx1"/>
-                </a:solidFill>
-              </a:rPr>
-              <a:t>sahip</a:t>
-            </a:r>
-            <a:r>
-              <a:rPr lang="en-US" sz="1600" dirty="0">
-                <a:solidFill>
-                  <a:schemeClr val="tx1"/>
-                </a:solidFill>
-              </a:rPr>
-              <a:t> ama </a:t>
-            </a:r>
-            <a:r>
-              <a:rPr lang="en-US" sz="1600" dirty="0" err="1">
-                <a:solidFill>
-                  <a:schemeClr val="tx1"/>
-                </a:solidFill>
-              </a:rPr>
-              <a:t>özellikleri</a:t>
-            </a:r>
-            <a:r>
-              <a:rPr lang="en-US" sz="1600" dirty="0">
-                <a:solidFill>
-                  <a:schemeClr val="tx1"/>
-                </a:solidFill>
-              </a:rPr>
-              <a:t> </a:t>
-            </a:r>
-            <a:r>
-              <a:rPr lang="en-US" sz="1600" dirty="0" err="1">
-                <a:solidFill>
-                  <a:schemeClr val="tx1"/>
-                </a:solidFill>
-              </a:rPr>
-              <a:t>biraz</a:t>
-            </a:r>
-            <a:r>
-              <a:rPr lang="en-US" sz="1600" dirty="0">
-                <a:solidFill>
-                  <a:schemeClr val="tx1"/>
-                </a:solidFill>
-              </a:rPr>
-              <a:t> </a:t>
-            </a:r>
-            <a:r>
-              <a:rPr lang="en-US" sz="1600" dirty="0" err="1">
-                <a:solidFill>
-                  <a:schemeClr val="tx1"/>
-                </a:solidFill>
-              </a:rPr>
-              <a:t>daha</a:t>
-            </a:r>
-            <a:r>
-              <a:rPr lang="en-US" sz="1600" dirty="0">
-                <a:solidFill>
-                  <a:schemeClr val="tx1"/>
-                </a:solidFill>
-              </a:rPr>
-              <a:t> </a:t>
-            </a:r>
-            <a:r>
-              <a:rPr lang="en-US" sz="1600" dirty="0" err="1">
-                <a:solidFill>
-                  <a:schemeClr val="tx1"/>
-                </a:solidFill>
-              </a:rPr>
-              <a:t>kısıtlanmış</a:t>
-            </a:r>
-            <a:r>
-              <a:rPr lang="en-US" sz="1600" dirty="0">
-                <a:solidFill>
-                  <a:schemeClr val="tx1"/>
-                </a:solidFill>
-              </a:rPr>
-              <a:t>.</a:t>
+              <a:t> activity özelliklerine sahip ama özellikleri biraz daha kısıtlanmış.</a:t>
             </a:r>
             <a:endParaRPr lang="tr-TR" sz="1600" dirty="0">
               <a:solidFill>
@@ -24153,7 +22338,7 @@
           <a:lstStyle/>
           <a:p>
             <a:pPr algn="ctr"/>
-            <a:endParaRPr lang="en-US"/>
+            <a:endParaRPr lang="en-US" dirty="0"/>
           </a:p>
         </p:txBody>
       </p:sp>
@@ -24471,7 +22656,7 @@
                     <a:bodyPr/>
                     <a:lstStyle/>
                     <a:p>
-                      <a:endParaRPr lang="en-US"/>
+                      <a:endParaRPr lang="en-US" dirty="0"/>
                     </a:p>
                   </a:txBody>
                   <a:tcPr/>
@@ -24790,7 +22975,7 @@
           <a:lstStyle/>
           <a:p>
             <a:pPr algn="ctr"/>
-            <a:endParaRPr lang="en-US"/>
+            <a:endParaRPr lang="en-US" dirty="0"/>
           </a:p>
         </p:txBody>
       </p:sp>
@@ -25103,7 +23288,7 @@
                     <a:bodyPr/>
                     <a:lstStyle/>
                     <a:p>
-                      <a:endParaRPr lang="en-US"/>
+                      <a:endParaRPr lang="en-US" dirty="0"/>
                     </a:p>
                   </a:txBody>
                   <a:tcPr/>
@@ -25159,20 +23344,12 @@
                     </a:p>
                     <a:p>
                       <a:r>
-                        <a:rPr lang="en-US" sz="1800" i="1" dirty="0" err="1">
-                          <a:solidFill>
-                            <a:schemeClr val="bg1"/>
-                          </a:solidFill>
-                        </a:rPr>
-                        <a:t>classpath</a:t>
-                      </a:r>
-                      <a:r>
                         <a:rPr lang="en-US" sz="1800" i="1" dirty="0">
                           <a:solidFill>
                             <a:schemeClr val="bg1"/>
                           </a:solidFill>
                         </a:rPr>
-                        <a:t> "androidx.navigation:navigation-safe-args-gradle-plugin:2.3.3</a:t>
+                        <a:t>classpath "androidx.navigation:navigation-safe-args-gradle-plugin:2.3.3</a:t>
                       </a:r>
                       <a:endParaRPr lang="en-US" i="1" dirty="0">
                         <a:solidFill>
@@ -25225,23 +23402,7 @@
                             <a:schemeClr val="bg1"/>
                           </a:solidFill>
                         </a:rPr>
-                        <a:t>apply plugin: "</a:t>
-                      </a:r>
-                      <a:r>
-                        <a:rPr lang="en-US" sz="1800" i="1" dirty="0" err="1">
-                          <a:solidFill>
-                            <a:schemeClr val="bg1"/>
-                          </a:solidFill>
-                        </a:rPr>
-                        <a:t>androidx.navigation.safeargs.kotlin</a:t>
-                      </a:r>
-                      <a:r>
-                        <a:rPr lang="en-US" sz="1800" i="1" dirty="0">
-                          <a:solidFill>
-                            <a:schemeClr val="bg1"/>
-                          </a:solidFill>
-                        </a:rPr>
-                        <a:t>"</a:t>
+                        <a:t>apply plugin: "androidx.navigation.safeargs.kotlin"</a:t>
                       </a:r>
                       <a:endParaRPr lang="en-US" i="1" dirty="0">
                         <a:solidFill>
@@ -25314,7 +23475,7 @@
                     <a:bodyPr/>
                     <a:lstStyle/>
                     <a:p>
-                      <a:endParaRPr lang="en-US"/>
+                      <a:endParaRPr lang="en-US" dirty="0"/>
                     </a:p>
                   </a:txBody>
                   <a:tcPr/>

</xml_diff>